<commit_message>
updating validation II slides
</commit_message>
<xml_diff>
--- a/07 - Performance and Evaluation Pt 2/Model Selection and Validation - Part II.pptx
+++ b/07 - Performance and Evaluation Pt 2/Model Selection and Validation - Part II.pptx
@@ -6,7 +6,7 @@
     <p:sldMasterId id="2147483662" r:id="rId2"/>
   </p:sldMasterIdLst>
   <p:notesMasterIdLst>
-    <p:notesMasterId r:id="rId52"/>
+    <p:notesMasterId r:id="rId53"/>
   </p:notesMasterIdLst>
   <p:sldIdLst>
     <p:sldId id="256" r:id="rId3"/>
@@ -14,50 +14,51 @@
     <p:sldId id="498" r:id="rId5"/>
     <p:sldId id="318" r:id="rId6"/>
     <p:sldId id="323" r:id="rId7"/>
-    <p:sldId id="500" r:id="rId8"/>
-    <p:sldId id="286" r:id="rId9"/>
-    <p:sldId id="273" r:id="rId10"/>
-    <p:sldId id="287" r:id="rId11"/>
-    <p:sldId id="288" r:id="rId12"/>
-    <p:sldId id="468" r:id="rId13"/>
-    <p:sldId id="289" r:id="rId14"/>
-    <p:sldId id="290" r:id="rId15"/>
-    <p:sldId id="291" r:id="rId16"/>
-    <p:sldId id="292" r:id="rId17"/>
-    <p:sldId id="293" r:id="rId18"/>
-    <p:sldId id="469" r:id="rId19"/>
-    <p:sldId id="470" r:id="rId20"/>
-    <p:sldId id="296" r:id="rId21"/>
-    <p:sldId id="454" r:id="rId22"/>
-    <p:sldId id="297" r:id="rId23"/>
-    <p:sldId id="463" r:id="rId24"/>
-    <p:sldId id="464" r:id="rId25"/>
-    <p:sldId id="284" r:id="rId26"/>
-    <p:sldId id="474" r:id="rId27"/>
-    <p:sldId id="475" r:id="rId28"/>
-    <p:sldId id="476" r:id="rId29"/>
-    <p:sldId id="477" r:id="rId30"/>
-    <p:sldId id="478" r:id="rId31"/>
-    <p:sldId id="486" r:id="rId32"/>
-    <p:sldId id="484" r:id="rId33"/>
-    <p:sldId id="488" r:id="rId34"/>
-    <p:sldId id="489" r:id="rId35"/>
-    <p:sldId id="490" r:id="rId36"/>
-    <p:sldId id="491" r:id="rId37"/>
-    <p:sldId id="492" r:id="rId38"/>
-    <p:sldId id="493" r:id="rId39"/>
-    <p:sldId id="494" r:id="rId40"/>
-    <p:sldId id="495" r:id="rId41"/>
-    <p:sldId id="487" r:id="rId42"/>
-    <p:sldId id="485" r:id="rId43"/>
-    <p:sldId id="496" r:id="rId44"/>
-    <p:sldId id="473" r:id="rId45"/>
-    <p:sldId id="479" r:id="rId46"/>
-    <p:sldId id="481" r:id="rId47"/>
-    <p:sldId id="480" r:id="rId48"/>
-    <p:sldId id="482" r:id="rId49"/>
-    <p:sldId id="472" r:id="rId50"/>
-    <p:sldId id="499" r:id="rId51"/>
+    <p:sldId id="428" r:id="rId8"/>
+    <p:sldId id="500" r:id="rId9"/>
+    <p:sldId id="286" r:id="rId10"/>
+    <p:sldId id="273" r:id="rId11"/>
+    <p:sldId id="287" r:id="rId12"/>
+    <p:sldId id="288" r:id="rId13"/>
+    <p:sldId id="468" r:id="rId14"/>
+    <p:sldId id="289" r:id="rId15"/>
+    <p:sldId id="290" r:id="rId16"/>
+    <p:sldId id="291" r:id="rId17"/>
+    <p:sldId id="292" r:id="rId18"/>
+    <p:sldId id="293" r:id="rId19"/>
+    <p:sldId id="469" r:id="rId20"/>
+    <p:sldId id="470" r:id="rId21"/>
+    <p:sldId id="296" r:id="rId22"/>
+    <p:sldId id="454" r:id="rId23"/>
+    <p:sldId id="297" r:id="rId24"/>
+    <p:sldId id="463" r:id="rId25"/>
+    <p:sldId id="464" r:id="rId26"/>
+    <p:sldId id="284" r:id="rId27"/>
+    <p:sldId id="474" r:id="rId28"/>
+    <p:sldId id="475" r:id="rId29"/>
+    <p:sldId id="476" r:id="rId30"/>
+    <p:sldId id="477" r:id="rId31"/>
+    <p:sldId id="478" r:id="rId32"/>
+    <p:sldId id="486" r:id="rId33"/>
+    <p:sldId id="484" r:id="rId34"/>
+    <p:sldId id="488" r:id="rId35"/>
+    <p:sldId id="489" r:id="rId36"/>
+    <p:sldId id="490" r:id="rId37"/>
+    <p:sldId id="491" r:id="rId38"/>
+    <p:sldId id="492" r:id="rId39"/>
+    <p:sldId id="493" r:id="rId40"/>
+    <p:sldId id="494" r:id="rId41"/>
+    <p:sldId id="495" r:id="rId42"/>
+    <p:sldId id="487" r:id="rId43"/>
+    <p:sldId id="485" r:id="rId44"/>
+    <p:sldId id="496" r:id="rId45"/>
+    <p:sldId id="473" r:id="rId46"/>
+    <p:sldId id="479" r:id="rId47"/>
+    <p:sldId id="481" r:id="rId48"/>
+    <p:sldId id="480" r:id="rId49"/>
+    <p:sldId id="482" r:id="rId50"/>
+    <p:sldId id="472" r:id="rId51"/>
+    <p:sldId id="499" r:id="rId52"/>
   </p:sldIdLst>
   <p:sldSz cx="12192000" cy="6858000"/>
   <p:notesSz cx="6858000" cy="9144000"/>
@@ -295,7 +296,7 @@
       <p15:sldGuideLst xmlns:p15="http://schemas.microsoft.com/office/powerpoint/2012/main"/>
     </p:ext>
     <p:ext uri="http://customooxmlschemas.google.com/">
-      <go:slidesCustomData xmlns="" xmlns:mc="http://schemas.openxmlformats.org/markup-compatibility/2006" xmlns:mv="urn:schemas-microsoft-com:mac:vml" xmlns:c="http://schemas.openxmlformats.org/drawingml/2006/chart" xmlns:dgm="http://schemas.openxmlformats.org/drawingml/2006/diagram" xmlns:o="urn:schemas-microsoft-com:office:office" xmlns:v="urn:schemas-microsoft-com:vml" xmlns:pvml="urn:schemas-microsoft-com:office:powerpoint" xmlns:com="http://schemas.openxmlformats.org/drawingml/2006/compatibility" xmlns:p14="http://schemas.microsoft.com/office/powerpoint/2010/main" xmlns:p15="http://schemas.microsoft.com/office/powerpoint/2012/main" xmlns:go="http://customooxmlschemas.google.com/" r:id="rId53" roundtripDataSignature="AMtx7mjFyVUGRZWio+dc9dxzYsimUxNJbg=="/>
+      <go:slidesCustomData xmlns:go="http://customooxmlschemas.google.com/" xmlns:p15="http://schemas.microsoft.com/office/powerpoint/2012/main" xmlns:p14="http://schemas.microsoft.com/office/powerpoint/2010/main" xmlns:com="http://schemas.openxmlformats.org/drawingml/2006/compatibility" xmlns:pvml="urn:schemas-microsoft-com:office:powerpoint" xmlns:v="urn:schemas-microsoft-com:vml" xmlns:o="urn:schemas-microsoft-com:office:office" xmlns:dgm="http://schemas.openxmlformats.org/drawingml/2006/diagram" xmlns:c="http://schemas.openxmlformats.org/drawingml/2006/chart" xmlns:mv="urn:schemas-microsoft-com:mac:vml" xmlns:mc="http://schemas.openxmlformats.org/markup-compatibility/2006" xmlns="" r:id="rId54" roundtripDataSignature="AMtx7mjFyVUGRZWio+dc9dxzYsimUxNJbg=="/>
     </p:ext>
   </p:extLst>
 </p:presentation>
@@ -7772,10 +7773,10 @@
           </a:ln>
           <a:extLst>
             <a:ext uri="{FAA26D3D-D897-4be2-8F04-BA451C77F1D7}">
-              <ma14:placeholderFlag xmlns="" xmlns:ma14="http://schemas.microsoft.com/office/mac/drawingml/2011/main" val="1"/>
+              <ma14:placeholderFlag xmlns:ma14="http://schemas.microsoft.com/office/mac/drawingml/2011/main" xmlns="" val="1"/>
             </a:ext>
             <a:ext uri="{909E8E84-426E-40dd-AFC4-6F175D3DCCD1}">
-              <a14:hiddenFill xmlns:a14="http://schemas.microsoft.com/office/drawing/2010/main" xmlns="">
+              <a14:hiddenFill xmlns="" xmlns:a14="http://schemas.microsoft.com/office/drawing/2010/main">
                 <a:solidFill>
                   <a:srgbClr val="FFFFFF"/>
                 </a:solidFill>
@@ -7798,17 +7799,17 @@
           <a:noFill/>
           <a:extLst>
             <a:ext uri="{FAA26D3D-D897-4be2-8F04-BA451C77F1D7}">
-              <ma14:placeholderFlag xmlns="" xmlns:ma14="http://schemas.microsoft.com/office/mac/drawingml/2011/main" val="1"/>
+              <ma14:placeholderFlag xmlns:ma14="http://schemas.microsoft.com/office/mac/drawingml/2011/main" xmlns="" val="1"/>
             </a:ext>
             <a:ext uri="{909E8E84-426E-40dd-AFC4-6F175D3DCCD1}">
-              <a14:hiddenFill xmlns:a14="http://schemas.microsoft.com/office/drawing/2010/main" xmlns="">
+              <a14:hiddenFill xmlns="" xmlns:a14="http://schemas.microsoft.com/office/drawing/2010/main">
                 <a:solidFill>
                   <a:srgbClr val="FFFFFF"/>
                 </a:solidFill>
               </a14:hiddenFill>
             </a:ext>
             <a:ext uri="{91240B29-F687-4f45-9708-019B960494DF}">
-              <a14:hiddenLine xmlns:a14="http://schemas.microsoft.com/office/drawing/2010/main" xmlns="" w="9525">
+              <a14:hiddenLine xmlns="" xmlns:a14="http://schemas.microsoft.com/office/drawing/2010/main" w="9525">
                 <a:solidFill>
                   <a:srgbClr val="000000"/>
                 </a:solidFill>
@@ -8012,7 +8013,7 @@
                 <a:tabLst/>
                 <a:defRPr/>
               </a:pPr>
-              <a:t>8</a:t>
+              <a:t>9</a:t>
             </a:fld>
             <a:endParaRPr kumimoji="0" lang="en-US" sz="1200" b="0" i="0" u="none" strike="noStrike" kern="1200" cap="none" spc="0" normalizeH="0" baseline="0" noProof="0">
               <a:ln>
@@ -14466,6 +14467,106 @@
 </file>
 
 <file path=ppt/slides/slide10.xml><?xml version="1.0" encoding="utf-8"?>
+<p:sld xmlns:a="http://schemas.openxmlformats.org/drawingml/2006/main" xmlns:r="http://schemas.openxmlformats.org/officeDocument/2006/relationships" xmlns:p="http://schemas.openxmlformats.org/presentationml/2006/main">
+  <p:cSld>
+    <p:spTree>
+      <p:nvGrpSpPr>
+        <p:cNvPr id="1" name=""/>
+        <p:cNvGrpSpPr/>
+        <p:nvPr/>
+      </p:nvGrpSpPr>
+      <p:grpSpPr>
+        <a:xfrm>
+          <a:off x="0" y="0"/>
+          <a:ext cx="0" cy="0"/>
+          <a:chOff x="0" y="0"/>
+          <a:chExt cx="0" cy="0"/>
+        </a:xfrm>
+      </p:grpSpPr>
+      <p:sp>
+        <p:nvSpPr>
+          <p:cNvPr id="3" name="Title 2"/>
+          <p:cNvSpPr>
+            <a:spLocks noGrp="1"/>
+          </p:cNvSpPr>
+          <p:nvPr>
+            <p:ph type="title"/>
+          </p:nvPr>
+        </p:nvSpPr>
+        <p:spPr/>
+        <p:txBody>
+          <a:bodyPr/>
+          <a:lstStyle/>
+          <a:p>
+            <a:r>
+              <a:rPr lang="en-US" dirty="0"/>
+              <a:t>Why do we need to do model selection?</a:t>
+            </a:r>
+          </a:p>
+        </p:txBody>
+      </p:sp>
+      <p:sp>
+        <p:nvSpPr>
+          <p:cNvPr id="2" name="Content Placeholder 1"/>
+          <p:cNvSpPr>
+            <a:spLocks noGrp="1"/>
+          </p:cNvSpPr>
+          <p:nvPr>
+            <p:ph type="body" idx="1"/>
+          </p:nvPr>
+        </p:nvSpPr>
+        <p:spPr/>
+        <p:txBody>
+          <a:bodyPr/>
+          <a:lstStyle/>
+          <a:p>
+            <a:r>
+              <a:rPr lang="en-US" sz="2800" dirty="0"/>
+              <a:t>You’ve run a large number of different types of models varying …</a:t>
+            </a:r>
+          </a:p>
+          <a:p>
+            <a:endParaRPr lang="en-US" sz="2800" dirty="0"/>
+          </a:p>
+          <a:p>
+            <a:r>
+              <a:rPr lang="en-US" sz="2800" dirty="0"/>
+              <a:t>You need to understand what types of models are effective under what circumstances, </a:t>
+            </a:r>
+            <a:r>
+              <a:rPr lang="en-US" sz="2800" b="1" dirty="0"/>
+              <a:t>and</a:t>
+            </a:r>
+          </a:p>
+          <a:p>
+            <a:endParaRPr lang="en-US" sz="2800" b="1" dirty="0"/>
+          </a:p>
+          <a:p>
+            <a:r>
+              <a:rPr lang="en-US" sz="2800" dirty="0"/>
+              <a:t>You need to decide which one(s) to use in the </a:t>
+            </a:r>
+            <a:r>
+              <a:rPr lang="en-US" sz="2800" b="1" dirty="0"/>
+              <a:t>future</a:t>
+            </a:r>
+          </a:p>
+        </p:txBody>
+      </p:sp>
+    </p:spTree>
+    <p:extLst>
+      <p:ext uri="{BB962C8B-B14F-4D97-AF65-F5344CB8AC3E}">
+        <p14:creationId xmlns:p14="http://schemas.microsoft.com/office/powerpoint/2010/main" val="473448969"/>
+      </p:ext>
+    </p:extLst>
+  </p:cSld>
+  <p:clrMapOvr>
+    <a:masterClrMapping/>
+  </p:clrMapOvr>
+</p:sld>
+</file>
+
+<file path=ppt/slides/slide11.xml><?xml version="1.0" encoding="utf-8"?>
 <p:sld xmlns:a="http://schemas.openxmlformats.org/drawingml/2006/main" xmlns:r="http://schemas.openxmlformats.org/officeDocument/2006/relationships" xmlns:p="http://schemas.openxmlformats.org/presentationml/2006/main" show="0">
   <p:cSld>
     <p:spTree>
@@ -14562,7 +14663,7 @@
 </p:sld>
 </file>
 
-<file path=ppt/slides/slide11.xml><?xml version="1.0" encoding="utf-8"?>
+<file path=ppt/slides/slide12.xml><?xml version="1.0" encoding="utf-8"?>
 <p:sld xmlns:a="http://schemas.openxmlformats.org/drawingml/2006/main" xmlns:r="http://schemas.openxmlformats.org/officeDocument/2006/relationships" xmlns:p="http://schemas.openxmlformats.org/presentationml/2006/main" show="0">
   <p:cSld>
     <p:spTree>
@@ -14675,13 +14776,13 @@
   <p:clrMapOvr>
     <a:masterClrMapping/>
   </p:clrMapOvr>
-  <mc:AlternateContent xmlns:mc="http://schemas.openxmlformats.org/markup-compatibility/2006">
-    <mc:Choice xmlns:p14="http://schemas.microsoft.com/office/powerpoint/2010/main" Requires="p14">
+  <mc:AlternateContent xmlns:mc="http://schemas.openxmlformats.org/markup-compatibility/2006" xmlns:p14="http://schemas.microsoft.com/office/powerpoint/2010/main">
+    <mc:Choice Requires="p14">
       <p:transition spd="med" p14:dur="700">
         <p:fade/>
       </p:transition>
     </mc:Choice>
-    <mc:Fallback>
+    <mc:Fallback xmlns="">
       <p:transition spd="med">
         <p:fade/>
       </p:transition>
@@ -14690,7 +14791,7 @@
 </p:sld>
 </file>
 
-<file path=ppt/slides/slide12.xml><?xml version="1.0" encoding="utf-8"?>
+<file path=ppt/slides/slide13.xml><?xml version="1.0" encoding="utf-8"?>
 <p:sld xmlns:a="http://schemas.openxmlformats.org/drawingml/2006/main" xmlns:r="http://schemas.openxmlformats.org/officeDocument/2006/relationships" xmlns:p="http://schemas.openxmlformats.org/presentationml/2006/main" show="0">
   <p:cSld>
     <p:spTree>
@@ -15003,7 +15104,7 @@
 </p:sld>
 </file>
 
-<file path=ppt/slides/slide13.xml><?xml version="1.0" encoding="utf-8"?>
+<file path=ppt/slides/slide14.xml><?xml version="1.0" encoding="utf-8"?>
 <p:sld xmlns:a="http://schemas.openxmlformats.org/drawingml/2006/main" xmlns:r="http://schemas.openxmlformats.org/officeDocument/2006/relationships" xmlns:p="http://schemas.openxmlformats.org/presentationml/2006/main" show="0">
   <p:cSld>
     <p:spTree>
@@ -16643,7 +16744,7 @@
 </p:sld>
 </file>
 
-<file path=ppt/slides/slide14.xml><?xml version="1.0" encoding="utf-8"?>
+<file path=ppt/slides/slide15.xml><?xml version="1.0" encoding="utf-8"?>
 <p:sld xmlns:a="http://schemas.openxmlformats.org/drawingml/2006/main" xmlns:r="http://schemas.openxmlformats.org/officeDocument/2006/relationships" xmlns:p="http://schemas.openxmlformats.org/presentationml/2006/main" show="0">
   <p:cSld>
     <p:spTree>
@@ -17476,7 +17577,7 @@
 </p:sld>
 </file>
 
-<file path=ppt/slides/slide15.xml><?xml version="1.0" encoding="utf-8"?>
+<file path=ppt/slides/slide16.xml><?xml version="1.0" encoding="utf-8"?>
 <p:sld xmlns:a="http://schemas.openxmlformats.org/drawingml/2006/main" xmlns:r="http://schemas.openxmlformats.org/officeDocument/2006/relationships" xmlns:p="http://schemas.openxmlformats.org/presentationml/2006/main" show="0">
   <p:cSld>
     <p:spTree>
@@ -18308,7 +18409,7 @@
 </p:sld>
 </file>
 
-<file path=ppt/slides/slide16.xml><?xml version="1.0" encoding="utf-8"?>
+<file path=ppt/slides/slide17.xml><?xml version="1.0" encoding="utf-8"?>
 <p:sld xmlns:a="http://schemas.openxmlformats.org/drawingml/2006/main" xmlns:r="http://schemas.openxmlformats.org/officeDocument/2006/relationships" xmlns:p="http://schemas.openxmlformats.org/presentationml/2006/main" show="0">
   <p:cSld>
     <p:spTree>
@@ -19140,7 +19241,7 @@
 </p:sld>
 </file>
 
-<file path=ppt/slides/slide17.xml><?xml version="1.0" encoding="utf-8"?>
+<file path=ppt/slides/slide18.xml><?xml version="1.0" encoding="utf-8"?>
 <p:sld xmlns:a="http://schemas.openxmlformats.org/drawingml/2006/main" xmlns:r="http://schemas.openxmlformats.org/officeDocument/2006/relationships" xmlns:p="http://schemas.openxmlformats.org/presentationml/2006/main" show="0">
   <p:cSld>
     <p:spTree>
@@ -19972,7 +20073,7 @@
 </p:sld>
 </file>
 
-<file path=ppt/slides/slide18.xml><?xml version="1.0" encoding="utf-8"?>
+<file path=ppt/slides/slide19.xml><?xml version="1.0" encoding="utf-8"?>
 <p:sld xmlns:a="http://schemas.openxmlformats.org/drawingml/2006/main" xmlns:r="http://schemas.openxmlformats.org/officeDocument/2006/relationships" xmlns:p="http://schemas.openxmlformats.org/presentationml/2006/main" show="0">
   <p:cSld>
     <p:spTree>
@@ -20804,7 +20905,73 @@
 </p:sld>
 </file>
 
-<file path=ppt/slides/slide19.xml><?xml version="1.0" encoding="utf-8"?>
+<file path=ppt/slides/slide2.xml><?xml version="1.0" encoding="utf-8"?>
+<p:sld xmlns:a="http://schemas.openxmlformats.org/drawingml/2006/main" xmlns:r="http://schemas.openxmlformats.org/officeDocument/2006/relationships" xmlns:p="http://schemas.openxmlformats.org/presentationml/2006/main">
+  <p:cSld>
+    <p:spTree>
+      <p:nvGrpSpPr>
+        <p:cNvPr id="1" name=""/>
+        <p:cNvGrpSpPr/>
+        <p:nvPr/>
+      </p:nvGrpSpPr>
+      <p:grpSpPr>
+        <a:xfrm>
+          <a:off x="0" y="0"/>
+          <a:ext cx="0" cy="0"/>
+          <a:chOff x="0" y="0"/>
+          <a:chExt cx="0" cy="0"/>
+        </a:xfrm>
+      </p:grpSpPr>
+      <p:sp>
+        <p:nvSpPr>
+          <p:cNvPr id="4" name="Text Placeholder 3">
+            <a:extLst>
+              <a:ext uri="{FF2B5EF4-FFF2-40B4-BE49-F238E27FC236}">
+                <a16:creationId xmlns:a16="http://schemas.microsoft.com/office/drawing/2014/main" id="{5E600BA7-FA45-884F-9820-9E5F2CB7AA48}"/>
+              </a:ext>
+            </a:extLst>
+          </p:cNvPr>
+          <p:cNvSpPr>
+            <a:spLocks noGrp="1"/>
+          </p:cNvSpPr>
+          <p:nvPr>
+            <p:ph type="body" idx="4294967295"/>
+          </p:nvPr>
+        </p:nvSpPr>
+        <p:spPr>
+          <a:xfrm>
+            <a:off x="0" y="2724150"/>
+            <a:ext cx="11360150" cy="1409700"/>
+          </a:xfrm>
+        </p:spPr>
+        <p:txBody>
+          <a:bodyPr/>
+          <a:lstStyle/>
+          <a:p>
+            <a:pPr marL="76200" indent="0" algn="ctr">
+              <a:buNone/>
+            </a:pPr>
+            <a:r>
+              <a:rPr lang="en-US" sz="4800" dirty="0"/>
+              <a:t>Short Quiz</a:t>
+            </a:r>
+          </a:p>
+        </p:txBody>
+      </p:sp>
+    </p:spTree>
+    <p:extLst>
+      <p:ext uri="{BB962C8B-B14F-4D97-AF65-F5344CB8AC3E}">
+        <p14:creationId xmlns:p14="http://schemas.microsoft.com/office/powerpoint/2010/main" val="16011483"/>
+      </p:ext>
+    </p:extLst>
+  </p:cSld>
+  <p:clrMapOvr>
+    <a:masterClrMapping/>
+  </p:clrMapOvr>
+</p:sld>
+</file>
+
+<file path=ppt/slides/slide20.xml><?xml version="1.0" encoding="utf-8"?>
 <p:sld xmlns:a="http://schemas.openxmlformats.org/drawingml/2006/main" xmlns:r="http://schemas.openxmlformats.org/officeDocument/2006/relationships" xmlns:p="http://schemas.openxmlformats.org/presentationml/2006/main" show="0">
   <p:cSld>
     <p:spTree>
@@ -21893,73 +22060,7 @@
 </p:sld>
 </file>
 
-<file path=ppt/slides/slide2.xml><?xml version="1.0" encoding="utf-8"?>
-<p:sld xmlns:a="http://schemas.openxmlformats.org/drawingml/2006/main" xmlns:r="http://schemas.openxmlformats.org/officeDocument/2006/relationships" xmlns:p="http://schemas.openxmlformats.org/presentationml/2006/main">
-  <p:cSld>
-    <p:spTree>
-      <p:nvGrpSpPr>
-        <p:cNvPr id="1" name=""/>
-        <p:cNvGrpSpPr/>
-        <p:nvPr/>
-      </p:nvGrpSpPr>
-      <p:grpSpPr>
-        <a:xfrm>
-          <a:off x="0" y="0"/>
-          <a:ext cx="0" cy="0"/>
-          <a:chOff x="0" y="0"/>
-          <a:chExt cx="0" cy="0"/>
-        </a:xfrm>
-      </p:grpSpPr>
-      <p:sp>
-        <p:nvSpPr>
-          <p:cNvPr id="4" name="Text Placeholder 3">
-            <a:extLst>
-              <a:ext uri="{FF2B5EF4-FFF2-40B4-BE49-F238E27FC236}">
-                <a16:creationId xmlns:a16="http://schemas.microsoft.com/office/drawing/2014/main" id="{5E600BA7-FA45-884F-9820-9E5F2CB7AA48}"/>
-              </a:ext>
-            </a:extLst>
-          </p:cNvPr>
-          <p:cNvSpPr>
-            <a:spLocks noGrp="1"/>
-          </p:cNvSpPr>
-          <p:nvPr>
-            <p:ph type="body" idx="4294967295"/>
-          </p:nvPr>
-        </p:nvSpPr>
-        <p:spPr>
-          <a:xfrm>
-            <a:off x="0" y="2724150"/>
-            <a:ext cx="11360150" cy="1409700"/>
-          </a:xfrm>
-        </p:spPr>
-        <p:txBody>
-          <a:bodyPr/>
-          <a:lstStyle/>
-          <a:p>
-            <a:pPr marL="76200" indent="0" algn="ctr">
-              <a:buNone/>
-            </a:pPr>
-            <a:r>
-              <a:rPr lang="en-US" sz="4800" dirty="0"/>
-              <a:t>Short Quiz</a:t>
-            </a:r>
-          </a:p>
-        </p:txBody>
-      </p:sp>
-    </p:spTree>
-    <p:extLst>
-      <p:ext uri="{BB962C8B-B14F-4D97-AF65-F5344CB8AC3E}">
-        <p14:creationId xmlns:p14="http://schemas.microsoft.com/office/powerpoint/2010/main" val="16011483"/>
-      </p:ext>
-    </p:extLst>
-  </p:cSld>
-  <p:clrMapOvr>
-    <a:masterClrMapping/>
-  </p:clrMapOvr>
-</p:sld>
-</file>
-
-<file path=ppt/slides/slide20.xml><?xml version="1.0" encoding="utf-8"?>
+<file path=ppt/slides/slide21.xml><?xml version="1.0" encoding="utf-8"?>
 <p:sld xmlns:a="http://schemas.openxmlformats.org/drawingml/2006/main" xmlns:r="http://schemas.openxmlformats.org/officeDocument/2006/relationships" xmlns:p="http://schemas.openxmlformats.org/presentationml/2006/main" show="0">
   <p:cSld>
     <p:spTree>
@@ -22583,7 +22684,7 @@
 </p:sld>
 </file>
 
-<file path=ppt/slides/slide21.xml><?xml version="1.0" encoding="utf-8"?>
+<file path=ppt/slides/slide22.xml><?xml version="1.0" encoding="utf-8"?>
 <p:sld xmlns:a="http://schemas.openxmlformats.org/drawingml/2006/main" xmlns:r="http://schemas.openxmlformats.org/officeDocument/2006/relationships" xmlns:p="http://schemas.openxmlformats.org/presentationml/2006/main" show="0">
   <p:cSld>
     <p:spTree>
@@ -22746,7 +22847,7 @@
 </p:sld>
 </file>
 
-<file path=ppt/slides/slide22.xml><?xml version="1.0" encoding="utf-8"?>
+<file path=ppt/slides/slide23.xml><?xml version="1.0" encoding="utf-8"?>
 <p:sld xmlns:a="http://schemas.openxmlformats.org/drawingml/2006/main" xmlns:r="http://schemas.openxmlformats.org/officeDocument/2006/relationships" xmlns:p="http://schemas.openxmlformats.org/presentationml/2006/main">
   <p:cSld>
     <p:spTree>
@@ -22872,7 +22973,7 @@
 </p:sld>
 </file>
 
-<file path=ppt/slides/slide23.xml><?xml version="1.0" encoding="utf-8"?>
+<file path=ppt/slides/slide24.xml><?xml version="1.0" encoding="utf-8"?>
 <p:sld xmlns:a="http://schemas.openxmlformats.org/drawingml/2006/main" xmlns:r="http://schemas.openxmlformats.org/officeDocument/2006/relationships" xmlns:p="http://schemas.openxmlformats.org/presentationml/2006/main">
   <p:cSld>
     <p:spTree>
@@ -24006,7 +24107,7 @@
 </p:sld>
 </file>
 
-<file path=ppt/slides/slide24.xml><?xml version="1.0" encoding="utf-8"?>
+<file path=ppt/slides/slide25.xml><?xml version="1.0" encoding="utf-8"?>
 <p:sld xmlns:a="http://schemas.openxmlformats.org/drawingml/2006/main" xmlns:r="http://schemas.openxmlformats.org/officeDocument/2006/relationships" xmlns:p="http://schemas.openxmlformats.org/presentationml/2006/main">
   <p:cSld>
     <p:spTree>
@@ -24137,7 +24238,7 @@
 </p:sld>
 </file>
 
-<file path=ppt/slides/slide25.xml><?xml version="1.0" encoding="utf-8"?>
+<file path=ppt/slides/slide26.xml><?xml version="1.0" encoding="utf-8"?>
 <p:sld xmlns:a="http://schemas.openxmlformats.org/drawingml/2006/main" xmlns:r="http://schemas.openxmlformats.org/officeDocument/2006/relationships" xmlns:p="http://schemas.openxmlformats.org/presentationml/2006/main">
   <p:cSld>
     <p:spTree>
@@ -24229,7 +24330,7 @@
 </p:sld>
 </file>
 
-<file path=ppt/slides/slide26.xml><?xml version="1.0" encoding="utf-8"?>
+<file path=ppt/slides/slide27.xml><?xml version="1.0" encoding="utf-8"?>
 <p:sld xmlns:a="http://schemas.openxmlformats.org/drawingml/2006/main" xmlns:r="http://schemas.openxmlformats.org/officeDocument/2006/relationships" xmlns:p="http://schemas.openxmlformats.org/presentationml/2006/main">
   <p:cSld>
     <p:spTree>
@@ -24321,7 +24422,7 @@
 </p:sld>
 </file>
 
-<file path=ppt/slides/slide27.xml><?xml version="1.0" encoding="utf-8"?>
+<file path=ppt/slides/slide28.xml><?xml version="1.0" encoding="utf-8"?>
 <p:sld xmlns:a="http://schemas.openxmlformats.org/drawingml/2006/main" xmlns:r="http://schemas.openxmlformats.org/officeDocument/2006/relationships" xmlns:p="http://schemas.openxmlformats.org/presentationml/2006/main">
   <p:cSld>
     <p:spTree>
@@ -24413,7 +24514,7 @@
 </p:sld>
 </file>
 
-<file path=ppt/slides/slide28.xml><?xml version="1.0" encoding="utf-8"?>
+<file path=ppt/slides/slide29.xml><?xml version="1.0" encoding="utf-8"?>
 <p:sld xmlns:a="http://schemas.openxmlformats.org/drawingml/2006/main" xmlns:r="http://schemas.openxmlformats.org/officeDocument/2006/relationships" xmlns:p="http://schemas.openxmlformats.org/presentationml/2006/main">
   <p:cSld>
     <p:spTree>
@@ -24496,185 +24597,6 @@
     <p:extLst>
       <p:ext uri="{BB962C8B-B14F-4D97-AF65-F5344CB8AC3E}">
         <p14:creationId xmlns:p14="http://schemas.microsoft.com/office/powerpoint/2010/main" val="2714202845"/>
-      </p:ext>
-    </p:extLst>
-  </p:cSld>
-  <p:clrMapOvr>
-    <a:masterClrMapping/>
-  </p:clrMapOvr>
-</p:sld>
-</file>
-
-<file path=ppt/slides/slide29.xml><?xml version="1.0" encoding="utf-8"?>
-<p:sld xmlns:a="http://schemas.openxmlformats.org/drawingml/2006/main" xmlns:r="http://schemas.openxmlformats.org/officeDocument/2006/relationships" xmlns:p="http://schemas.openxmlformats.org/presentationml/2006/main">
-  <p:cSld>
-    <p:spTree>
-      <p:nvGrpSpPr>
-        <p:cNvPr id="1" name="Shape 454"/>
-        <p:cNvGrpSpPr/>
-        <p:nvPr/>
-      </p:nvGrpSpPr>
-      <p:grpSpPr>
-        <a:xfrm>
-          <a:off x="0" y="0"/>
-          <a:ext cx="0" cy="0"/>
-          <a:chOff x="0" y="0"/>
-          <a:chExt cx="0" cy="0"/>
-        </a:xfrm>
-      </p:grpSpPr>
-      <p:sp>
-        <p:nvSpPr>
-          <p:cNvPr id="455" name="Google Shape;455;p43"/>
-          <p:cNvSpPr txBox="1">
-            <a:spLocks noGrp="1"/>
-          </p:cNvSpPr>
-          <p:nvPr>
-            <p:ph type="title"/>
-          </p:nvPr>
-        </p:nvSpPr>
-        <p:spPr>
-          <a:prstGeom prst="rect">
-            <a:avLst/>
-          </a:prstGeom>
-        </p:spPr>
-        <p:txBody>
-          <a:bodyPr spcFirstLastPara="1" wrap="square" lIns="121900" tIns="60933" rIns="121900" bIns="60933" anchor="ctr" anchorCtr="0">
-            <a:noAutofit/>
-          </a:bodyPr>
-          <a:lstStyle/>
-          <a:p>
-            <a:r>
-              <a:rPr lang="en" dirty="0"/>
-              <a:t>Model Selection</a:t>
-            </a:r>
-            <a:endParaRPr sz="4000" b="1" dirty="0">
-              <a:latin typeface="Roboto"/>
-              <a:ea typeface="Roboto"/>
-              <a:cs typeface="Roboto"/>
-              <a:sym typeface="Roboto"/>
-            </a:endParaRPr>
-          </a:p>
-        </p:txBody>
-      </p:sp>
-      <p:sp>
-        <p:nvSpPr>
-          <p:cNvPr id="456" name="Google Shape;456;p43"/>
-          <p:cNvSpPr txBox="1">
-            <a:spLocks noGrp="1"/>
-          </p:cNvSpPr>
-          <p:nvPr>
-            <p:ph type="body" idx="1"/>
-          </p:nvPr>
-        </p:nvSpPr>
-        <p:spPr>
-          <a:xfrm>
-            <a:off x="415600" y="1536632"/>
-            <a:ext cx="11360700" cy="4787967"/>
-          </a:xfrm>
-          <a:prstGeom prst="rect">
-            <a:avLst/>
-          </a:prstGeom>
-        </p:spPr>
-        <p:txBody>
-          <a:bodyPr spcFirstLastPara="1" wrap="square" lIns="121900" tIns="60933" rIns="121900" bIns="60933" anchor="t" anchorCtr="0">
-            <a:noAutofit/>
-          </a:bodyPr>
-          <a:lstStyle/>
-          <a:p>
-            <a:pPr indent="-474121">
-              <a:buSzPts val="2000"/>
-            </a:pPr>
-            <a:r>
-              <a:rPr lang="en" sz="2667" dirty="0"/>
-              <a:t>How can you narrow hundreds or thousands of model specifications down to a handful of the best-performing ones?</a:t>
-            </a:r>
-            <a:br>
-              <a:rPr lang="en" sz="2667" dirty="0"/>
-            </a:br>
-            <a:endParaRPr sz="2667" dirty="0"/>
-          </a:p>
-          <a:p>
-            <a:pPr indent="-474121">
-              <a:spcBef>
-                <a:spcPts val="0"/>
-              </a:spcBef>
-              <a:buSzPts val="2000"/>
-            </a:pPr>
-            <a:r>
-              <a:rPr lang="en" sz="2667" dirty="0"/>
-              <a:t>How do you balance performance and stability?</a:t>
-            </a:r>
-            <a:endParaRPr sz="2667" dirty="0"/>
-          </a:p>
-          <a:p>
-            <a:pPr lvl="1" indent="-474121">
-              <a:spcBef>
-                <a:spcPts val="0"/>
-              </a:spcBef>
-              <a:buSzPts val="2000"/>
-            </a:pPr>
-            <a:r>
-              <a:rPr lang="en" sz="2667" dirty="0"/>
-              <a:t>mean performance?</a:t>
-            </a:r>
-            <a:endParaRPr sz="2667" dirty="0"/>
-          </a:p>
-          <a:p>
-            <a:pPr lvl="1" indent="-474121">
-              <a:spcBef>
-                <a:spcPts val="0"/>
-              </a:spcBef>
-              <a:buSzPts val="2000"/>
-            </a:pPr>
-            <a:r>
-              <a:rPr lang="en" sz="2667" dirty="0"/>
-              <a:t>balancing mean and variance?</a:t>
-            </a:r>
-            <a:endParaRPr sz="2667" dirty="0"/>
-          </a:p>
-          <a:p>
-            <a:pPr lvl="1" indent="-474121">
-              <a:spcBef>
-                <a:spcPts val="0"/>
-              </a:spcBef>
-              <a:buSzPts val="2000"/>
-            </a:pPr>
-            <a:r>
-              <a:rPr lang="en" sz="2667" dirty="0"/>
-              <a:t>recency-weighted mean?</a:t>
-            </a:r>
-            <a:br>
-              <a:rPr lang="en" sz="2667" dirty="0"/>
-            </a:br>
-            <a:endParaRPr sz="2667" dirty="0"/>
-          </a:p>
-          <a:p>
-            <a:pPr indent="-474121">
-              <a:spcBef>
-                <a:spcPts val="0"/>
-              </a:spcBef>
-              <a:buSzPts val="2000"/>
-            </a:pPr>
-            <a:r>
-              <a:rPr lang="en" sz="2667" dirty="0"/>
-              <a:t>W</a:t>
-            </a:r>
-            <a:r>
-              <a:rPr lang="en-US" sz="2667" dirty="0"/>
-              <a:t>h</a:t>
-            </a:r>
-            <a:r>
-              <a:rPr lang="en" sz="2667" dirty="0"/>
-              <a:t>at is the “regret” in subsequent time periods from using different strategies for choosing a model to deploy?</a:t>
-            </a:r>
-            <a:endParaRPr sz="2667" dirty="0"/>
-          </a:p>
-        </p:txBody>
-      </p:sp>
-    </p:spTree>
-    <p:extLst>
-      <p:ext uri="{BB962C8B-B14F-4D97-AF65-F5344CB8AC3E}">
-        <p14:creationId xmlns:p14="http://schemas.microsoft.com/office/powerpoint/2010/main" val="1094637480"/>
       </p:ext>
     </p:extLst>
   </p:cSld>
@@ -24805,7 +24727,10 @@
               </a:rPr>
               <a:t>update assignment</a:t>
             </a:r>
-            <a:endParaRPr lang="en-US" dirty="0"/>
+            <a:r>
+              <a:rPr lang="en-US" dirty="0"/>
+              <a:t> (and revisions from last week)</a:t>
+            </a:r>
           </a:p>
           <a:p>
             <a:r>
@@ -24831,8 +24756,13 @@
           <a:p>
             <a:r>
               <a:rPr lang="en-US" dirty="0"/>
-              <a:t>Midterm Project Progress Presentations</a:t>
-            </a:r>
+              <a:t>Midterm Project Progress Presentations (Live </a:t>
+            </a:r>
+            <a:r>
+              <a:rPr lang="en-US"/>
+              <a:t>or Recorded?)</a:t>
+            </a:r>
+            <a:endParaRPr lang="en-US" dirty="0"/>
           </a:p>
         </p:txBody>
       </p:sp>
@@ -24925,6 +24855,185 @@
           </a:bodyPr>
           <a:lstStyle/>
           <a:p>
+            <a:pPr indent="-474121">
+              <a:buSzPts val="2000"/>
+            </a:pPr>
+            <a:r>
+              <a:rPr lang="en" sz="2667" dirty="0"/>
+              <a:t>How can you narrow hundreds or thousands of model specifications down to a handful of the best-performing ones?</a:t>
+            </a:r>
+            <a:br>
+              <a:rPr lang="en" sz="2667" dirty="0"/>
+            </a:br>
+            <a:endParaRPr sz="2667" dirty="0"/>
+          </a:p>
+          <a:p>
+            <a:pPr indent="-474121">
+              <a:spcBef>
+                <a:spcPts val="0"/>
+              </a:spcBef>
+              <a:buSzPts val="2000"/>
+            </a:pPr>
+            <a:r>
+              <a:rPr lang="en" sz="2667" dirty="0"/>
+              <a:t>How do you balance performance and stability?</a:t>
+            </a:r>
+            <a:endParaRPr sz="2667" dirty="0"/>
+          </a:p>
+          <a:p>
+            <a:pPr lvl="1" indent="-474121">
+              <a:spcBef>
+                <a:spcPts val="0"/>
+              </a:spcBef>
+              <a:buSzPts val="2000"/>
+            </a:pPr>
+            <a:r>
+              <a:rPr lang="en" sz="2667" dirty="0"/>
+              <a:t>mean performance?</a:t>
+            </a:r>
+            <a:endParaRPr sz="2667" dirty="0"/>
+          </a:p>
+          <a:p>
+            <a:pPr lvl="1" indent="-474121">
+              <a:spcBef>
+                <a:spcPts val="0"/>
+              </a:spcBef>
+              <a:buSzPts val="2000"/>
+            </a:pPr>
+            <a:r>
+              <a:rPr lang="en" sz="2667" dirty="0"/>
+              <a:t>balancing mean and variance?</a:t>
+            </a:r>
+            <a:endParaRPr sz="2667" dirty="0"/>
+          </a:p>
+          <a:p>
+            <a:pPr lvl="1" indent="-474121">
+              <a:spcBef>
+                <a:spcPts val="0"/>
+              </a:spcBef>
+              <a:buSzPts val="2000"/>
+            </a:pPr>
+            <a:r>
+              <a:rPr lang="en" sz="2667" dirty="0"/>
+              <a:t>recency-weighted mean?</a:t>
+            </a:r>
+            <a:br>
+              <a:rPr lang="en" sz="2667" dirty="0"/>
+            </a:br>
+            <a:endParaRPr sz="2667" dirty="0"/>
+          </a:p>
+          <a:p>
+            <a:pPr indent="-474121">
+              <a:spcBef>
+                <a:spcPts val="0"/>
+              </a:spcBef>
+              <a:buSzPts val="2000"/>
+            </a:pPr>
+            <a:r>
+              <a:rPr lang="en" sz="2667" dirty="0"/>
+              <a:t>W</a:t>
+            </a:r>
+            <a:r>
+              <a:rPr lang="en-US" sz="2667" dirty="0"/>
+              <a:t>h</a:t>
+            </a:r>
+            <a:r>
+              <a:rPr lang="en" sz="2667" dirty="0"/>
+              <a:t>at is the “regret” in subsequent time periods from using different strategies for choosing a model to deploy?</a:t>
+            </a:r>
+            <a:endParaRPr sz="2667" dirty="0"/>
+          </a:p>
+        </p:txBody>
+      </p:sp>
+    </p:spTree>
+    <p:extLst>
+      <p:ext uri="{BB962C8B-B14F-4D97-AF65-F5344CB8AC3E}">
+        <p14:creationId xmlns:p14="http://schemas.microsoft.com/office/powerpoint/2010/main" val="1094637480"/>
+      </p:ext>
+    </p:extLst>
+  </p:cSld>
+  <p:clrMapOvr>
+    <a:masterClrMapping/>
+  </p:clrMapOvr>
+</p:sld>
+</file>
+
+<file path=ppt/slides/slide31.xml><?xml version="1.0" encoding="utf-8"?>
+<p:sld xmlns:a="http://schemas.openxmlformats.org/drawingml/2006/main" xmlns:r="http://schemas.openxmlformats.org/officeDocument/2006/relationships" xmlns:p="http://schemas.openxmlformats.org/presentationml/2006/main">
+  <p:cSld>
+    <p:spTree>
+      <p:nvGrpSpPr>
+        <p:cNvPr id="1" name="Shape 454"/>
+        <p:cNvGrpSpPr/>
+        <p:nvPr/>
+      </p:nvGrpSpPr>
+      <p:grpSpPr>
+        <a:xfrm>
+          <a:off x="0" y="0"/>
+          <a:ext cx="0" cy="0"/>
+          <a:chOff x="0" y="0"/>
+          <a:chExt cx="0" cy="0"/>
+        </a:xfrm>
+      </p:grpSpPr>
+      <p:sp>
+        <p:nvSpPr>
+          <p:cNvPr id="455" name="Google Shape;455;p43"/>
+          <p:cNvSpPr txBox="1">
+            <a:spLocks noGrp="1"/>
+          </p:cNvSpPr>
+          <p:nvPr>
+            <p:ph type="title"/>
+          </p:nvPr>
+        </p:nvSpPr>
+        <p:spPr>
+          <a:prstGeom prst="rect">
+            <a:avLst/>
+          </a:prstGeom>
+        </p:spPr>
+        <p:txBody>
+          <a:bodyPr spcFirstLastPara="1" wrap="square" lIns="121900" tIns="60933" rIns="121900" bIns="60933" anchor="ctr" anchorCtr="0">
+            <a:noAutofit/>
+          </a:bodyPr>
+          <a:lstStyle/>
+          <a:p>
+            <a:r>
+              <a:rPr lang="en" dirty="0"/>
+              <a:t>Model Selection</a:t>
+            </a:r>
+            <a:endParaRPr sz="4000" b="1" dirty="0">
+              <a:latin typeface="Roboto"/>
+              <a:ea typeface="Roboto"/>
+              <a:cs typeface="Roboto"/>
+              <a:sym typeface="Roboto"/>
+            </a:endParaRPr>
+          </a:p>
+        </p:txBody>
+      </p:sp>
+      <p:sp>
+        <p:nvSpPr>
+          <p:cNvPr id="456" name="Google Shape;456;p43"/>
+          <p:cNvSpPr txBox="1">
+            <a:spLocks noGrp="1"/>
+          </p:cNvSpPr>
+          <p:nvPr>
+            <p:ph type="body" idx="1"/>
+          </p:nvPr>
+        </p:nvSpPr>
+        <p:spPr>
+          <a:xfrm>
+            <a:off x="415600" y="1536632"/>
+            <a:ext cx="11360700" cy="4787967"/>
+          </a:xfrm>
+          <a:prstGeom prst="rect">
+            <a:avLst/>
+          </a:prstGeom>
+        </p:spPr>
+        <p:txBody>
+          <a:bodyPr spcFirstLastPara="1" wrap="square" lIns="121900" tIns="60933" rIns="121900" bIns="60933" anchor="t" anchorCtr="0">
+            <a:noAutofit/>
+          </a:bodyPr>
+          <a:lstStyle/>
+          <a:p>
             <a:pPr marL="0" indent="0">
               <a:buSzPts val="2000"/>
               <a:buNone/>
@@ -24997,7 +25106,7 @@
 </p:sld>
 </file>
 
-<file path=ppt/slides/slide31.xml><?xml version="1.0" encoding="utf-8"?>
+<file path=ppt/slides/slide32.xml><?xml version="1.0" encoding="utf-8"?>
 <p:sld xmlns:a="http://schemas.openxmlformats.org/drawingml/2006/main" xmlns:r="http://schemas.openxmlformats.org/officeDocument/2006/relationships" xmlns:p="http://schemas.openxmlformats.org/presentationml/2006/main">
   <p:cSld>
     <p:spTree>
@@ -25199,7 +25308,7 @@
 </p:sld>
 </file>
 
-<file path=ppt/slides/slide32.xml><?xml version="1.0" encoding="utf-8"?>
+<file path=ppt/slides/slide33.xml><?xml version="1.0" encoding="utf-8"?>
 <p:sld xmlns:a="http://schemas.openxmlformats.org/drawingml/2006/main" xmlns:r="http://schemas.openxmlformats.org/officeDocument/2006/relationships" xmlns:p="http://schemas.openxmlformats.org/presentationml/2006/main">
   <p:cSld>
     <p:spTree>
@@ -25418,7 +25527,7 @@
 </p:sld>
 </file>
 
-<file path=ppt/slides/slide33.xml><?xml version="1.0" encoding="utf-8"?>
+<file path=ppt/slides/slide34.xml><?xml version="1.0" encoding="utf-8"?>
 <p:sld xmlns:a="http://schemas.openxmlformats.org/drawingml/2006/main" xmlns:r="http://schemas.openxmlformats.org/officeDocument/2006/relationships" xmlns:p="http://schemas.openxmlformats.org/presentationml/2006/main">
   <p:cSld>
     <p:spTree>
@@ -25878,7 +25987,7 @@
 </p:sld>
 </file>
 
-<file path=ppt/slides/slide34.xml><?xml version="1.0" encoding="utf-8"?>
+<file path=ppt/slides/slide35.xml><?xml version="1.0" encoding="utf-8"?>
 <p:sld xmlns:a="http://schemas.openxmlformats.org/drawingml/2006/main" xmlns:r="http://schemas.openxmlformats.org/officeDocument/2006/relationships" xmlns:p="http://schemas.openxmlformats.org/presentationml/2006/main">
   <p:cSld>
     <p:spTree>
@@ -26144,7 +26253,7 @@
 </p:sld>
 </file>
 
-<file path=ppt/slides/slide35.xml><?xml version="1.0" encoding="utf-8"?>
+<file path=ppt/slides/slide36.xml><?xml version="1.0" encoding="utf-8"?>
 <p:sld xmlns:a="http://schemas.openxmlformats.org/drawingml/2006/main" xmlns:r="http://schemas.openxmlformats.org/officeDocument/2006/relationships" xmlns:p="http://schemas.openxmlformats.org/presentationml/2006/main">
   <p:cSld>
     <p:spTree>
@@ -26455,7 +26564,7 @@
 </p:sld>
 </file>
 
-<file path=ppt/slides/slide36.xml><?xml version="1.0" encoding="utf-8"?>
+<file path=ppt/slides/slide37.xml><?xml version="1.0" encoding="utf-8"?>
 <p:sld xmlns:a="http://schemas.openxmlformats.org/drawingml/2006/main" xmlns:r="http://schemas.openxmlformats.org/officeDocument/2006/relationships" xmlns:p="http://schemas.openxmlformats.org/presentationml/2006/main">
   <p:cSld>
     <p:spTree>
@@ -26783,7 +26892,7 @@
 </p:sld>
 </file>
 
-<file path=ppt/slides/slide37.xml><?xml version="1.0" encoding="utf-8"?>
+<file path=ppt/slides/slide38.xml><?xml version="1.0" encoding="utf-8"?>
 <p:sld xmlns:a="http://schemas.openxmlformats.org/drawingml/2006/main" xmlns:r="http://schemas.openxmlformats.org/officeDocument/2006/relationships" xmlns:p="http://schemas.openxmlformats.org/presentationml/2006/main">
   <p:cSld>
     <p:spTree>
@@ -27108,7 +27217,7 @@
 </p:sld>
 </file>
 
-<file path=ppt/slides/slide38.xml><?xml version="1.0" encoding="utf-8"?>
+<file path=ppt/slides/slide39.xml><?xml version="1.0" encoding="utf-8"?>
 <p:sld xmlns:a="http://schemas.openxmlformats.org/drawingml/2006/main" xmlns:r="http://schemas.openxmlformats.org/officeDocument/2006/relationships" xmlns:p="http://schemas.openxmlformats.org/presentationml/2006/main">
   <p:cSld>
     <p:spTree>
@@ -27594,7 +27703,131 @@
 </p:sld>
 </file>
 
-<file path=ppt/slides/slide39.xml><?xml version="1.0" encoding="utf-8"?>
+<file path=ppt/slides/slide4.xml><?xml version="1.0" encoding="utf-8"?>
+<p:sld xmlns:a="http://schemas.openxmlformats.org/drawingml/2006/main" xmlns:r="http://schemas.openxmlformats.org/officeDocument/2006/relationships" xmlns:p="http://schemas.openxmlformats.org/presentationml/2006/main">
+  <p:cSld>
+    <p:spTree>
+      <p:nvGrpSpPr>
+        <p:cNvPr id="1" name=""/>
+        <p:cNvGrpSpPr/>
+        <p:nvPr/>
+      </p:nvGrpSpPr>
+      <p:grpSpPr>
+        <a:xfrm>
+          <a:off x="0" y="0"/>
+          <a:ext cx="0" cy="0"/>
+          <a:chOff x="0" y="0"/>
+          <a:chExt cx="0" cy="0"/>
+        </a:xfrm>
+      </p:grpSpPr>
+      <p:sp>
+        <p:nvSpPr>
+          <p:cNvPr id="2" name="Title 1">
+            <a:extLst>
+              <a:ext uri="{FF2B5EF4-FFF2-40B4-BE49-F238E27FC236}">
+                <a16:creationId xmlns:a16="http://schemas.microsoft.com/office/drawing/2014/main" id="{A073B702-ED77-884E-88F7-92D73313F38D}"/>
+              </a:ext>
+            </a:extLst>
+          </p:cNvPr>
+          <p:cNvSpPr>
+            <a:spLocks noGrp="1"/>
+          </p:cNvSpPr>
+          <p:nvPr>
+            <p:ph type="title"/>
+          </p:nvPr>
+        </p:nvSpPr>
+        <p:spPr/>
+        <p:txBody>
+          <a:bodyPr/>
+          <a:lstStyle/>
+          <a:p>
+            <a:r>
+              <a:rPr lang="en-US" dirty="0"/>
+              <a:t>Plan for the week</a:t>
+            </a:r>
+          </a:p>
+        </p:txBody>
+      </p:sp>
+      <p:sp>
+        <p:nvSpPr>
+          <p:cNvPr id="3" name="Text Placeholder 2">
+            <a:extLst>
+              <a:ext uri="{FF2B5EF4-FFF2-40B4-BE49-F238E27FC236}">
+                <a16:creationId xmlns:a16="http://schemas.microsoft.com/office/drawing/2014/main" id="{7861BAD4-F7FB-1D48-9D37-2273592A75CE}"/>
+              </a:ext>
+            </a:extLst>
+          </p:cNvPr>
+          <p:cNvSpPr>
+            <a:spLocks noGrp="1"/>
+          </p:cNvSpPr>
+          <p:nvPr>
+            <p:ph type="body" idx="1"/>
+          </p:nvPr>
+        </p:nvSpPr>
+        <p:spPr/>
+        <p:txBody>
+          <a:bodyPr/>
+          <a:lstStyle/>
+          <a:p>
+            <a:r>
+              <a:rPr lang="en-US" dirty="0"/>
+              <a:t>What you should be discussing this week within your team</a:t>
+            </a:r>
+          </a:p>
+          <a:p>
+            <a:pPr lvl="1"/>
+            <a:r>
+              <a:rPr lang="en-US" dirty="0"/>
+              <a:t>Refining pipeline structure</a:t>
+            </a:r>
+          </a:p>
+          <a:p>
+            <a:pPr lvl="1"/>
+            <a:r>
+              <a:rPr lang="en-US" dirty="0"/>
+              <a:t>Features you want to build</a:t>
+            </a:r>
+          </a:p>
+          <a:p>
+            <a:pPr lvl="1"/>
+            <a:endParaRPr lang="en-US" dirty="0"/>
+          </a:p>
+          <a:p>
+            <a:r>
+              <a:rPr lang="en-US" dirty="0"/>
+              <a:t>What you should be building this week</a:t>
+            </a:r>
+          </a:p>
+          <a:p>
+            <a:pPr lvl="1"/>
+            <a:r>
+              <a:rPr lang="en-US" dirty="0"/>
+              <a:t>Pipeline updates based on feedback from Wednesday</a:t>
+            </a:r>
+          </a:p>
+          <a:p>
+            <a:pPr lvl="1"/>
+            <a:r>
+              <a:rPr lang="en-US" dirty="0"/>
+              <a:t>Iterating on code for validation splits, model grid, feature sets</a:t>
+            </a:r>
+          </a:p>
+        </p:txBody>
+      </p:sp>
+    </p:spTree>
+    <p:extLst>
+      <p:ext uri="{BB962C8B-B14F-4D97-AF65-F5344CB8AC3E}">
+        <p14:creationId xmlns:p14="http://schemas.microsoft.com/office/powerpoint/2010/main" val="4125266482"/>
+      </p:ext>
+    </p:extLst>
+  </p:cSld>
+  <p:clrMapOvr>
+    <a:masterClrMapping/>
+  </p:clrMapOvr>
+</p:sld>
+</file>
+
+<file path=ppt/slides/slide40.xml><?xml version="1.0" encoding="utf-8"?>
 <p:sld xmlns:a="http://schemas.openxmlformats.org/drawingml/2006/main" xmlns:r="http://schemas.openxmlformats.org/officeDocument/2006/relationships" xmlns:p="http://schemas.openxmlformats.org/presentationml/2006/main">
   <p:cSld>
     <p:spTree>
@@ -28126,131 +28359,7 @@
 </p:sld>
 </file>
 
-<file path=ppt/slides/slide4.xml><?xml version="1.0" encoding="utf-8"?>
-<p:sld xmlns:a="http://schemas.openxmlformats.org/drawingml/2006/main" xmlns:r="http://schemas.openxmlformats.org/officeDocument/2006/relationships" xmlns:p="http://schemas.openxmlformats.org/presentationml/2006/main">
-  <p:cSld>
-    <p:spTree>
-      <p:nvGrpSpPr>
-        <p:cNvPr id="1" name=""/>
-        <p:cNvGrpSpPr/>
-        <p:nvPr/>
-      </p:nvGrpSpPr>
-      <p:grpSpPr>
-        <a:xfrm>
-          <a:off x="0" y="0"/>
-          <a:ext cx="0" cy="0"/>
-          <a:chOff x="0" y="0"/>
-          <a:chExt cx="0" cy="0"/>
-        </a:xfrm>
-      </p:grpSpPr>
-      <p:sp>
-        <p:nvSpPr>
-          <p:cNvPr id="2" name="Title 1">
-            <a:extLst>
-              <a:ext uri="{FF2B5EF4-FFF2-40B4-BE49-F238E27FC236}">
-                <a16:creationId xmlns:a16="http://schemas.microsoft.com/office/drawing/2014/main" id="{A073B702-ED77-884E-88F7-92D73313F38D}"/>
-              </a:ext>
-            </a:extLst>
-          </p:cNvPr>
-          <p:cNvSpPr>
-            <a:spLocks noGrp="1"/>
-          </p:cNvSpPr>
-          <p:nvPr>
-            <p:ph type="title"/>
-          </p:nvPr>
-        </p:nvSpPr>
-        <p:spPr/>
-        <p:txBody>
-          <a:bodyPr/>
-          <a:lstStyle/>
-          <a:p>
-            <a:r>
-              <a:rPr lang="en-US" dirty="0"/>
-              <a:t>Plan for the week</a:t>
-            </a:r>
-          </a:p>
-        </p:txBody>
-      </p:sp>
-      <p:sp>
-        <p:nvSpPr>
-          <p:cNvPr id="3" name="Text Placeholder 2">
-            <a:extLst>
-              <a:ext uri="{FF2B5EF4-FFF2-40B4-BE49-F238E27FC236}">
-                <a16:creationId xmlns:a16="http://schemas.microsoft.com/office/drawing/2014/main" id="{7861BAD4-F7FB-1D48-9D37-2273592A75CE}"/>
-              </a:ext>
-            </a:extLst>
-          </p:cNvPr>
-          <p:cNvSpPr>
-            <a:spLocks noGrp="1"/>
-          </p:cNvSpPr>
-          <p:nvPr>
-            <p:ph type="body" idx="1"/>
-          </p:nvPr>
-        </p:nvSpPr>
-        <p:spPr/>
-        <p:txBody>
-          <a:bodyPr/>
-          <a:lstStyle/>
-          <a:p>
-            <a:r>
-              <a:rPr lang="en-US" dirty="0"/>
-              <a:t>What you should be discussing this week within your team</a:t>
-            </a:r>
-          </a:p>
-          <a:p>
-            <a:pPr lvl="1"/>
-            <a:r>
-              <a:rPr lang="en-US" dirty="0"/>
-              <a:t>Refining pipeline structure</a:t>
-            </a:r>
-          </a:p>
-          <a:p>
-            <a:pPr lvl="1"/>
-            <a:r>
-              <a:rPr lang="en-US" dirty="0"/>
-              <a:t>Features you want to build</a:t>
-            </a:r>
-          </a:p>
-          <a:p>
-            <a:pPr lvl="1"/>
-            <a:endParaRPr lang="en-US" dirty="0"/>
-          </a:p>
-          <a:p>
-            <a:r>
-              <a:rPr lang="en-US" dirty="0"/>
-              <a:t>What you should be building this week</a:t>
-            </a:r>
-          </a:p>
-          <a:p>
-            <a:pPr lvl="1"/>
-            <a:r>
-              <a:rPr lang="en-US" dirty="0"/>
-              <a:t>Pipeline updates based on feedback from Wednesday</a:t>
-            </a:r>
-          </a:p>
-          <a:p>
-            <a:pPr lvl="1"/>
-            <a:r>
-              <a:rPr lang="en-US" dirty="0"/>
-              <a:t>Iterating on code for validation splits, model grid, feature sets</a:t>
-            </a:r>
-          </a:p>
-        </p:txBody>
-      </p:sp>
-    </p:spTree>
-    <p:extLst>
-      <p:ext uri="{BB962C8B-B14F-4D97-AF65-F5344CB8AC3E}">
-        <p14:creationId xmlns:p14="http://schemas.microsoft.com/office/powerpoint/2010/main" val="4125266482"/>
-      </p:ext>
-    </p:extLst>
-  </p:cSld>
-  <p:clrMapOvr>
-    <a:masterClrMapping/>
-  </p:clrMapOvr>
-</p:sld>
-</file>
-
-<file path=ppt/slides/slide40.xml><?xml version="1.0" encoding="utf-8"?>
+<file path=ppt/slides/slide41.xml><?xml version="1.0" encoding="utf-8"?>
 <p:sld xmlns:a="http://schemas.openxmlformats.org/drawingml/2006/main" xmlns:r="http://schemas.openxmlformats.org/officeDocument/2006/relationships" xmlns:p="http://schemas.openxmlformats.org/presentationml/2006/main">
   <p:cSld>
     <p:spTree>
@@ -28344,7 +28453,7 @@
 </p:sld>
 </file>
 
-<file path=ppt/slides/slide41.xml><?xml version="1.0" encoding="utf-8"?>
+<file path=ppt/slides/slide42.xml><?xml version="1.0" encoding="utf-8"?>
 <p:sld xmlns:a="http://schemas.openxmlformats.org/drawingml/2006/main" xmlns:r="http://schemas.openxmlformats.org/officeDocument/2006/relationships" xmlns:p="http://schemas.openxmlformats.org/presentationml/2006/main">
   <p:cSld>
     <p:spTree>
@@ -28438,7 +28547,7 @@
 </p:sld>
 </file>
 
-<file path=ppt/slides/slide42.xml><?xml version="1.0" encoding="utf-8"?>
+<file path=ppt/slides/slide43.xml><?xml version="1.0" encoding="utf-8"?>
 <p:sld xmlns:a="http://schemas.openxmlformats.org/drawingml/2006/main" xmlns:r="http://schemas.openxmlformats.org/officeDocument/2006/relationships" xmlns:p="http://schemas.openxmlformats.org/presentationml/2006/main">
   <p:cSld>
     <p:spTree>
@@ -28600,127 +28709,6 @@
 </p:sld>
 </file>
 
-<file path=ppt/slides/slide43.xml><?xml version="1.0" encoding="utf-8"?>
-<p:sld xmlns:a="http://schemas.openxmlformats.org/drawingml/2006/main" xmlns:r="http://schemas.openxmlformats.org/officeDocument/2006/relationships" xmlns:p="http://schemas.openxmlformats.org/presentationml/2006/main">
-  <p:cSld>
-    <p:spTree>
-      <p:nvGrpSpPr>
-        <p:cNvPr id="1" name=""/>
-        <p:cNvGrpSpPr/>
-        <p:nvPr/>
-      </p:nvGrpSpPr>
-      <p:grpSpPr>
-        <a:xfrm>
-          <a:off x="0" y="0"/>
-          <a:ext cx="0" cy="0"/>
-          <a:chOff x="0" y="0"/>
-          <a:chExt cx="0" cy="0"/>
-        </a:xfrm>
-      </p:grpSpPr>
-      <p:sp>
-        <p:nvSpPr>
-          <p:cNvPr id="3" name="Title 2">
-            <a:extLst>
-              <a:ext uri="{FF2B5EF4-FFF2-40B4-BE49-F238E27FC236}">
-                <a16:creationId xmlns:a16="http://schemas.microsoft.com/office/drawing/2014/main" id="{9323871C-7CA8-1448-8FFC-1AE6E1838941}"/>
-              </a:ext>
-            </a:extLst>
-          </p:cNvPr>
-          <p:cNvSpPr>
-            <a:spLocks noGrp="1"/>
-          </p:cNvSpPr>
-          <p:nvPr>
-            <p:ph type="title"/>
-          </p:nvPr>
-        </p:nvSpPr>
-        <p:spPr/>
-        <p:txBody>
-          <a:bodyPr/>
-          <a:lstStyle/>
-          <a:p>
-            <a:r>
-              <a:rPr lang="en-US" dirty="0"/>
-              <a:t>Some Open Research Questions</a:t>
-            </a:r>
-          </a:p>
-        </p:txBody>
-      </p:sp>
-      <p:sp>
-        <p:nvSpPr>
-          <p:cNvPr id="4" name="Text Placeholder 3">
-            <a:extLst>
-              <a:ext uri="{FF2B5EF4-FFF2-40B4-BE49-F238E27FC236}">
-                <a16:creationId xmlns:a16="http://schemas.microsoft.com/office/drawing/2014/main" id="{5E600BA7-FA45-884F-9820-9E5F2CB7AA48}"/>
-              </a:ext>
-            </a:extLst>
-          </p:cNvPr>
-          <p:cNvSpPr>
-            <a:spLocks noGrp="1"/>
-          </p:cNvSpPr>
-          <p:nvPr>
-            <p:ph type="body" idx="1"/>
-          </p:nvPr>
-        </p:nvSpPr>
-        <p:spPr/>
-        <p:txBody>
-          <a:bodyPr/>
-          <a:lstStyle/>
-          <a:p>
-            <a:r>
-              <a:rPr lang="en-US" dirty="0"/>
-              <a:t>What are the conditions under which temporal validation out-performs traditional cross-validation? By how much?</a:t>
-            </a:r>
-            <a:br>
-              <a:rPr lang="en-US" dirty="0"/>
-            </a:br>
-            <a:endParaRPr lang="en-US" dirty="0"/>
-          </a:p>
-          <a:p>
-            <a:r>
-              <a:rPr lang="en-US" dirty="0"/>
-              <a:t>Likewise, what can we learn about how well certain strategies perform in terms of regret under different real-world conditions?</a:t>
-            </a:r>
-            <a:br>
-              <a:rPr lang="en-US" dirty="0"/>
-            </a:br>
-            <a:endParaRPr lang="en-US" dirty="0"/>
-          </a:p>
-          <a:p>
-            <a:r>
-              <a:rPr lang="en-US" dirty="0"/>
-              <a:t>Many problems in policy settings involve resource constraints that require optimization at the top of the list, but few methods optimize for this directly.</a:t>
-            </a:r>
-          </a:p>
-          <a:p>
-            <a:pPr lvl="1"/>
-            <a:r>
-              <a:rPr lang="en-US" dirty="0"/>
-              <a:t>e.g., </a:t>
-            </a:r>
-            <a:r>
-              <a:rPr lang="en-US" dirty="0" err="1"/>
-              <a:t>Transductive</a:t>
-            </a:r>
-            <a:r>
-              <a:rPr lang="en-US" dirty="0"/>
-              <a:t> Top k</a:t>
-            </a:r>
-          </a:p>
-        </p:txBody>
-      </p:sp>
-    </p:spTree>
-    <p:extLst>
-      <p:ext uri="{BB962C8B-B14F-4D97-AF65-F5344CB8AC3E}">
-        <p14:creationId xmlns:p14="http://schemas.microsoft.com/office/powerpoint/2010/main" val="136932352"/>
-      </p:ext>
-    </p:extLst>
-  </p:cSld>
-  <p:clrMapOvr>
-    <a:masterClrMapping/>
-  </p:clrMapOvr>
-</p:sld>
-</file>
-
 <file path=ppt/slides/slide44.xml><?xml version="1.0" encoding="utf-8"?>
 <p:sld xmlns:a="http://schemas.openxmlformats.org/drawingml/2006/main" xmlns:r="http://schemas.openxmlformats.org/officeDocument/2006/relationships" xmlns:p="http://schemas.openxmlformats.org/presentationml/2006/main">
   <p:cSld>
@@ -28766,40 +28754,73 @@
           </a:p>
         </p:txBody>
       </p:sp>
-      <p:pic>
-        <p:nvPicPr>
-          <p:cNvPr id="6" name="Picture 5">
+      <p:sp>
+        <p:nvSpPr>
+          <p:cNvPr id="4" name="Text Placeholder 3">
             <a:extLst>
               <a:ext uri="{FF2B5EF4-FFF2-40B4-BE49-F238E27FC236}">
-                <a16:creationId xmlns:a16="http://schemas.microsoft.com/office/drawing/2014/main" id="{4B9B5C17-6333-3542-BF92-961541BDC881}"/>
+                <a16:creationId xmlns:a16="http://schemas.microsoft.com/office/drawing/2014/main" id="{5E600BA7-FA45-884F-9820-9E5F2CB7AA48}"/>
               </a:ext>
             </a:extLst>
           </p:cNvPr>
-          <p:cNvPicPr>
-            <a:picLocks noChangeAspect="1"/>
-          </p:cNvPicPr>
-          <p:nvPr/>
-        </p:nvPicPr>
-        <p:blipFill>
-          <a:blip r:embed="rId2"/>
-          <a:stretch>
-            <a:fillRect/>
-          </a:stretch>
-        </p:blipFill>
-        <p:spPr>
-          <a:xfrm>
-            <a:off x="1169439" y="1257300"/>
-            <a:ext cx="9853121" cy="5023746"/>
-          </a:xfrm>
-          <a:prstGeom prst="rect">
-            <a:avLst/>
-          </a:prstGeom>
-        </p:spPr>
-      </p:pic>
+          <p:cNvSpPr>
+            <a:spLocks noGrp="1"/>
+          </p:cNvSpPr>
+          <p:nvPr>
+            <p:ph type="body" idx="1"/>
+          </p:nvPr>
+        </p:nvSpPr>
+        <p:spPr/>
+        <p:txBody>
+          <a:bodyPr/>
+          <a:lstStyle/>
+          <a:p>
+            <a:r>
+              <a:rPr lang="en-US" dirty="0"/>
+              <a:t>What are the conditions under which temporal validation out-performs traditional cross-validation? By how much?</a:t>
+            </a:r>
+            <a:br>
+              <a:rPr lang="en-US" dirty="0"/>
+            </a:br>
+            <a:endParaRPr lang="en-US" dirty="0"/>
+          </a:p>
+          <a:p>
+            <a:r>
+              <a:rPr lang="en-US" dirty="0"/>
+              <a:t>Likewise, what can we learn about how well certain strategies perform in terms of regret under different real-world conditions?</a:t>
+            </a:r>
+            <a:br>
+              <a:rPr lang="en-US" dirty="0"/>
+            </a:br>
+            <a:endParaRPr lang="en-US" dirty="0"/>
+          </a:p>
+          <a:p>
+            <a:r>
+              <a:rPr lang="en-US" dirty="0"/>
+              <a:t>Many problems in policy settings involve resource constraints that require optimization at the top of the list, but few methods optimize for this directly.</a:t>
+            </a:r>
+          </a:p>
+          <a:p>
+            <a:pPr lvl="1"/>
+            <a:r>
+              <a:rPr lang="en-US" dirty="0"/>
+              <a:t>e.g., </a:t>
+            </a:r>
+            <a:r>
+              <a:rPr lang="en-US" dirty="0" err="1"/>
+              <a:t>Transductive</a:t>
+            </a:r>
+            <a:r>
+              <a:rPr lang="en-US" dirty="0"/>
+              <a:t> Top k</a:t>
+            </a:r>
+          </a:p>
+        </p:txBody>
+      </p:sp>
     </p:spTree>
     <p:extLst>
       <p:ext uri="{BB962C8B-B14F-4D97-AF65-F5344CB8AC3E}">
-        <p14:creationId xmlns:p14="http://schemas.microsoft.com/office/powerpoint/2010/main" val="1478637945"/>
+        <p14:creationId xmlns:p14="http://schemas.microsoft.com/office/powerpoint/2010/main" val="136932352"/>
       </p:ext>
     </p:extLst>
   </p:cSld>
@@ -28854,102 +28875,40 @@
           </a:p>
         </p:txBody>
       </p:sp>
-      <p:sp>
-        <p:nvSpPr>
-          <p:cNvPr id="4" name="Text Placeholder 3">
+      <p:pic>
+        <p:nvPicPr>
+          <p:cNvPr id="6" name="Picture 5">
             <a:extLst>
               <a:ext uri="{FF2B5EF4-FFF2-40B4-BE49-F238E27FC236}">
-                <a16:creationId xmlns:a16="http://schemas.microsoft.com/office/drawing/2014/main" id="{5E600BA7-FA45-884F-9820-9E5F2CB7AA48}"/>
+                <a16:creationId xmlns:a16="http://schemas.microsoft.com/office/drawing/2014/main" id="{4B9B5C17-6333-3542-BF92-961541BDC881}"/>
               </a:ext>
             </a:extLst>
           </p:cNvPr>
-          <p:cNvSpPr>
-            <a:spLocks noGrp="1"/>
-          </p:cNvSpPr>
-          <p:nvPr>
-            <p:ph type="body" idx="1"/>
-          </p:nvPr>
-        </p:nvSpPr>
-        <p:spPr/>
-        <p:txBody>
-          <a:bodyPr/>
-          <a:lstStyle/>
-          <a:p>
-            <a:r>
-              <a:rPr lang="en-US" dirty="0"/>
-              <a:t>The SVM loss function will find the “best” separating hyperplane overall, but perhaps we could draw a better hyperplane to separate just </a:t>
-            </a:r>
-            <a:r>
-              <a:rPr lang="en-US" i="1" dirty="0"/>
-              <a:t>k</a:t>
-            </a:r>
-            <a:r>
-              <a:rPr lang="en-US" dirty="0"/>
-              <a:t> positive examples?</a:t>
-            </a:r>
-            <a:br>
-              <a:rPr lang="en-US" dirty="0"/>
-            </a:br>
-            <a:endParaRPr lang="en-US" dirty="0"/>
-          </a:p>
-          <a:p>
-            <a:r>
-              <a:rPr lang="en-US" i="1" dirty="0" err="1"/>
-              <a:t>Transductive</a:t>
-            </a:r>
-            <a:r>
-              <a:rPr lang="en-US" dirty="0"/>
-              <a:t> method: needs to be aware of the test set </a:t>
-            </a:r>
-            <a:r>
-              <a:rPr lang="en-US" b="1" dirty="0"/>
-              <a:t>without labels</a:t>
-            </a:r>
-            <a:r>
-              <a:rPr lang="en-US" dirty="0"/>
-              <a:t> to select just </a:t>
-            </a:r>
-            <a:r>
-              <a:rPr lang="en-US" i="1" dirty="0"/>
-              <a:t>k</a:t>
-            </a:r>
-            <a:r>
-              <a:rPr lang="en-US" dirty="0"/>
-              <a:t> test examples.</a:t>
-            </a:r>
-            <a:br>
-              <a:rPr lang="en-US" dirty="0"/>
-            </a:br>
-            <a:endParaRPr lang="en-US" dirty="0"/>
-          </a:p>
-          <a:p>
-            <a:r>
-              <a:rPr lang="en-US" dirty="0"/>
-              <a:t>Modified gradient descent procedure to project gradient direction for L2-regularized SVM loss onto a “feasible solution cone” such that </a:t>
-            </a:r>
-            <a:r>
-              <a:rPr lang="en-US" u="sng" dirty="0"/>
-              <a:t>no more than</a:t>
-            </a:r>
-            <a:r>
-              <a:rPr lang="en-US" dirty="0"/>
-              <a:t> </a:t>
-            </a:r>
-            <a:r>
-              <a:rPr lang="en-US" i="1" dirty="0"/>
-              <a:t>k</a:t>
-            </a:r>
-            <a:r>
-              <a:rPr lang="en-US" dirty="0"/>
-              <a:t> test examples will be predicted positive after the step.</a:t>
-            </a:r>
-          </a:p>
-        </p:txBody>
-      </p:sp>
+          <p:cNvPicPr>
+            <a:picLocks noChangeAspect="1"/>
+          </p:cNvPicPr>
+          <p:nvPr/>
+        </p:nvPicPr>
+        <p:blipFill>
+          <a:blip r:embed="rId2"/>
+          <a:stretch>
+            <a:fillRect/>
+          </a:stretch>
+        </p:blipFill>
+        <p:spPr>
+          <a:xfrm>
+            <a:off x="1169439" y="1257300"/>
+            <a:ext cx="9853121" cy="5023746"/>
+          </a:xfrm>
+          <a:prstGeom prst="rect">
+            <a:avLst/>
+          </a:prstGeom>
+        </p:spPr>
+      </p:pic>
     </p:spTree>
     <p:extLst>
       <p:ext uri="{BB962C8B-B14F-4D97-AF65-F5344CB8AC3E}">
-        <p14:creationId xmlns:p14="http://schemas.microsoft.com/office/powerpoint/2010/main" val="94907443"/>
+        <p14:creationId xmlns:p14="http://schemas.microsoft.com/office/powerpoint/2010/main" val="1478637945"/>
       </p:ext>
     </p:extLst>
   </p:cSld>
@@ -29004,40 +28963,102 @@
           </a:p>
         </p:txBody>
       </p:sp>
-      <p:pic>
-        <p:nvPicPr>
-          <p:cNvPr id="2" name="Picture 1">
+      <p:sp>
+        <p:nvSpPr>
+          <p:cNvPr id="4" name="Text Placeholder 3">
             <a:extLst>
               <a:ext uri="{FF2B5EF4-FFF2-40B4-BE49-F238E27FC236}">
-                <a16:creationId xmlns:a16="http://schemas.microsoft.com/office/drawing/2014/main" id="{23F8960D-806C-F441-9A23-1578C38467D8}"/>
+                <a16:creationId xmlns:a16="http://schemas.microsoft.com/office/drawing/2014/main" id="{5E600BA7-FA45-884F-9820-9E5F2CB7AA48}"/>
               </a:ext>
             </a:extLst>
           </p:cNvPr>
-          <p:cNvPicPr>
-            <a:picLocks noChangeAspect="1"/>
-          </p:cNvPicPr>
-          <p:nvPr/>
-        </p:nvPicPr>
-        <p:blipFill>
-          <a:blip r:embed="rId2"/>
-          <a:stretch>
-            <a:fillRect/>
-          </a:stretch>
-        </p:blipFill>
-        <p:spPr>
-          <a:xfrm>
-            <a:off x="2749550" y="1371600"/>
-            <a:ext cx="6692900" cy="4114800"/>
-          </a:xfrm>
-          <a:prstGeom prst="rect">
-            <a:avLst/>
-          </a:prstGeom>
-        </p:spPr>
-      </p:pic>
+          <p:cNvSpPr>
+            <a:spLocks noGrp="1"/>
+          </p:cNvSpPr>
+          <p:nvPr>
+            <p:ph type="body" idx="1"/>
+          </p:nvPr>
+        </p:nvSpPr>
+        <p:spPr/>
+        <p:txBody>
+          <a:bodyPr/>
+          <a:lstStyle/>
+          <a:p>
+            <a:r>
+              <a:rPr lang="en-US" dirty="0"/>
+              <a:t>The SVM loss function will find the “best” separating hyperplane overall, but perhaps we could draw a better hyperplane to separate just </a:t>
+            </a:r>
+            <a:r>
+              <a:rPr lang="en-US" i="1" dirty="0"/>
+              <a:t>k</a:t>
+            </a:r>
+            <a:r>
+              <a:rPr lang="en-US" dirty="0"/>
+              <a:t> positive examples?</a:t>
+            </a:r>
+            <a:br>
+              <a:rPr lang="en-US" dirty="0"/>
+            </a:br>
+            <a:endParaRPr lang="en-US" dirty="0"/>
+          </a:p>
+          <a:p>
+            <a:r>
+              <a:rPr lang="en-US" i="1" dirty="0" err="1"/>
+              <a:t>Transductive</a:t>
+            </a:r>
+            <a:r>
+              <a:rPr lang="en-US" dirty="0"/>
+              <a:t> method: needs to be aware of the test set </a:t>
+            </a:r>
+            <a:r>
+              <a:rPr lang="en-US" b="1" dirty="0"/>
+              <a:t>without labels</a:t>
+            </a:r>
+            <a:r>
+              <a:rPr lang="en-US" dirty="0"/>
+              <a:t> to select just </a:t>
+            </a:r>
+            <a:r>
+              <a:rPr lang="en-US" i="1" dirty="0"/>
+              <a:t>k</a:t>
+            </a:r>
+            <a:r>
+              <a:rPr lang="en-US" dirty="0"/>
+              <a:t> test examples.</a:t>
+            </a:r>
+            <a:br>
+              <a:rPr lang="en-US" dirty="0"/>
+            </a:br>
+            <a:endParaRPr lang="en-US" dirty="0"/>
+          </a:p>
+          <a:p>
+            <a:r>
+              <a:rPr lang="en-US" dirty="0"/>
+              <a:t>Modified gradient descent procedure to project gradient direction for L2-regularized SVM loss onto a “feasible solution cone” such that </a:t>
+            </a:r>
+            <a:r>
+              <a:rPr lang="en-US" u="sng" dirty="0"/>
+              <a:t>no more than</a:t>
+            </a:r>
+            <a:r>
+              <a:rPr lang="en-US" dirty="0"/>
+              <a:t> </a:t>
+            </a:r>
+            <a:r>
+              <a:rPr lang="en-US" i="1" dirty="0"/>
+              <a:t>k</a:t>
+            </a:r>
+            <a:r>
+              <a:rPr lang="en-US" dirty="0"/>
+              <a:t> test examples will be predicted positive after the step.</a:t>
+            </a:r>
+          </a:p>
+        </p:txBody>
+      </p:sp>
     </p:spTree>
     <p:extLst>
       <p:ext uri="{BB962C8B-B14F-4D97-AF65-F5344CB8AC3E}">
-        <p14:creationId xmlns:p14="http://schemas.microsoft.com/office/powerpoint/2010/main" val="1715242992"/>
+        <p14:creationId xmlns:p14="http://schemas.microsoft.com/office/powerpoint/2010/main" val="94907443"/>
       </p:ext>
     </p:extLst>
   </p:cSld>
@@ -29092,110 +29113,40 @@
           </a:p>
         </p:txBody>
       </p:sp>
-      <p:sp>
-        <p:nvSpPr>
-          <p:cNvPr id="4" name="Text Placeholder 3">
+      <p:pic>
+        <p:nvPicPr>
+          <p:cNvPr id="2" name="Picture 1">
             <a:extLst>
               <a:ext uri="{FF2B5EF4-FFF2-40B4-BE49-F238E27FC236}">
-                <a16:creationId xmlns:a16="http://schemas.microsoft.com/office/drawing/2014/main" id="{5E600BA7-FA45-884F-9820-9E5F2CB7AA48}"/>
+                <a16:creationId xmlns:a16="http://schemas.microsoft.com/office/drawing/2014/main" id="{23F8960D-806C-F441-9A23-1578C38467D8}"/>
               </a:ext>
             </a:extLst>
           </p:cNvPr>
-          <p:cNvSpPr>
-            <a:spLocks noGrp="1"/>
-          </p:cNvSpPr>
-          <p:nvPr>
-            <p:ph type="body" idx="1"/>
-          </p:nvPr>
-        </p:nvSpPr>
+          <p:cNvPicPr>
+            <a:picLocks noChangeAspect="1"/>
+          </p:cNvPicPr>
+          <p:nvPr/>
+        </p:nvPicPr>
+        <p:blipFill>
+          <a:blip r:embed="rId2"/>
+          <a:stretch>
+            <a:fillRect/>
+          </a:stretch>
+        </p:blipFill>
         <p:spPr>
           <a:xfrm>
-            <a:off x="415600" y="1219133"/>
-            <a:ext cx="11360700" cy="5234804"/>
+            <a:off x="2749550" y="1371600"/>
+            <a:ext cx="6692900" cy="4114800"/>
           </a:xfrm>
+          <a:prstGeom prst="rect">
+            <a:avLst/>
+          </a:prstGeom>
         </p:spPr>
-        <p:txBody>
-          <a:bodyPr/>
-          <a:lstStyle/>
-          <a:p>
-            <a:pPr marL="76200" indent="0">
-              <a:buNone/>
-            </a:pPr>
-            <a:r>
-              <a:rPr lang="en-US" dirty="0"/>
-              <a:t>Paper shows improvements on synthetic examples and some “standard” datasets, but still more to investigate:</a:t>
-            </a:r>
-            <a:br>
-              <a:rPr lang="en-US" dirty="0"/>
-            </a:br>
-            <a:endParaRPr lang="en-US" dirty="0"/>
-          </a:p>
-          <a:p>
-            <a:r>
-              <a:rPr lang="en-US" dirty="0"/>
-              <a:t>Can be slow to converge on larger datasets</a:t>
-            </a:r>
-            <a:br>
-              <a:rPr lang="en-US" dirty="0"/>
-            </a:br>
-            <a:endParaRPr lang="en-US" dirty="0"/>
-          </a:p>
-          <a:p>
-            <a:r>
-              <a:rPr lang="en-US" dirty="0"/>
-              <a:t>“At most” </a:t>
-            </a:r>
-            <a:r>
-              <a:rPr lang="en-US" i="1" dirty="0"/>
-              <a:t>k</a:t>
-            </a:r>
-            <a:r>
-              <a:rPr lang="en-US" dirty="0"/>
-              <a:t> examples can yield many fewer than the desired </a:t>
-            </a:r>
-            <a:r>
-              <a:rPr lang="en-US" i="1" dirty="0"/>
-              <a:t>k</a:t>
-            </a:r>
-            <a:r>
-              <a:rPr lang="en-US" dirty="0"/>
-              <a:t>, particularly for rare events (why doesn’t the algorithm target </a:t>
-            </a:r>
-            <a:r>
-              <a:rPr lang="en-US" i="1" dirty="0"/>
-              <a:t>exactly k</a:t>
-            </a:r>
-            <a:r>
-              <a:rPr lang="en-US" dirty="0"/>
-              <a:t>?)</a:t>
-            </a:r>
-            <a:br>
-              <a:rPr lang="en-US" dirty="0"/>
-            </a:br>
-            <a:endParaRPr lang="en-US" dirty="0"/>
-          </a:p>
-          <a:p>
-            <a:r>
-              <a:rPr lang="en-US" dirty="0"/>
-              <a:t> Although creating a “top k” boundary, still penalizes false positives and false negatives equally during optimization</a:t>
-            </a:r>
-            <a:br>
-              <a:rPr lang="en-US" dirty="0"/>
-            </a:br>
-            <a:endParaRPr lang="en-US" dirty="0"/>
-          </a:p>
-          <a:p>
-            <a:r>
-              <a:rPr lang="en-US" dirty="0"/>
-              <a:t>Can we do better at the top, even if we don’t have access to the test list?</a:t>
-            </a:r>
-          </a:p>
-        </p:txBody>
-      </p:sp>
+      </p:pic>
     </p:spTree>
     <p:extLst>
       <p:ext uri="{BB962C8B-B14F-4D97-AF65-F5344CB8AC3E}">
-        <p14:creationId xmlns:p14="http://schemas.microsoft.com/office/powerpoint/2010/main" val="4118118316"/>
+        <p14:creationId xmlns:p14="http://schemas.microsoft.com/office/powerpoint/2010/main" val="1715242992"/>
       </p:ext>
     </p:extLst>
   </p:cSld>
@@ -29245,7 +29196,7 @@
           <a:p>
             <a:r>
               <a:rPr lang="en-US" dirty="0"/>
-              <a:t>Discussion Question</a:t>
+              <a:t>Some Open Research Questions</a:t>
             </a:r>
           </a:p>
         </p:txBody>
@@ -29266,17 +29217,86 @@
             <p:ph type="body" idx="1"/>
           </p:nvPr>
         </p:nvSpPr>
-        <p:spPr/>
+        <p:spPr>
+          <a:xfrm>
+            <a:off x="415600" y="1219133"/>
+            <a:ext cx="11360700" cy="5234804"/>
+          </a:xfrm>
+        </p:spPr>
         <p:txBody>
           <a:bodyPr/>
           <a:lstStyle/>
           <a:p>
-            <a:pPr marL="76200" indent="0" algn="ctr">
+            <a:pPr marL="76200" indent="0">
               <a:buNone/>
             </a:pPr>
             <a:r>
-              <a:rPr lang="en-US" sz="3600" dirty="0"/>
-              <a:t>What would be some potential strategies for integrating considerations around fairness in the process of model evaluation and selection?</a:t>
+              <a:rPr lang="en-US" dirty="0"/>
+              <a:t>Paper shows improvements on synthetic examples and some “standard” datasets, but still more to investigate:</a:t>
+            </a:r>
+            <a:br>
+              <a:rPr lang="en-US" dirty="0"/>
+            </a:br>
+            <a:endParaRPr lang="en-US" dirty="0"/>
+          </a:p>
+          <a:p>
+            <a:r>
+              <a:rPr lang="en-US" dirty="0"/>
+              <a:t>Can be slow to converge on larger datasets</a:t>
+            </a:r>
+            <a:br>
+              <a:rPr lang="en-US" dirty="0"/>
+            </a:br>
+            <a:endParaRPr lang="en-US" dirty="0"/>
+          </a:p>
+          <a:p>
+            <a:r>
+              <a:rPr lang="en-US" dirty="0"/>
+              <a:t>“At most” </a:t>
+            </a:r>
+            <a:r>
+              <a:rPr lang="en-US" i="1" dirty="0"/>
+              <a:t>k</a:t>
+            </a:r>
+            <a:r>
+              <a:rPr lang="en-US" dirty="0"/>
+              <a:t> examples can yield many fewer than the desired </a:t>
+            </a:r>
+            <a:r>
+              <a:rPr lang="en-US" i="1" dirty="0"/>
+              <a:t>k</a:t>
+            </a:r>
+            <a:r>
+              <a:rPr lang="en-US" dirty="0"/>
+              <a:t>, particularly for rare events (why doesn’t the algorithm target </a:t>
+            </a:r>
+            <a:r>
+              <a:rPr lang="en-US" i="1" dirty="0"/>
+              <a:t>exactly k</a:t>
+            </a:r>
+            <a:r>
+              <a:rPr lang="en-US" dirty="0"/>
+              <a:t>?)</a:t>
+            </a:r>
+            <a:br>
+              <a:rPr lang="en-US" dirty="0"/>
+            </a:br>
+            <a:endParaRPr lang="en-US" dirty="0"/>
+          </a:p>
+          <a:p>
+            <a:r>
+              <a:rPr lang="en-US" dirty="0"/>
+              <a:t> Although creating a “top k” boundary, still penalizes false positives and false negatives equally during optimization</a:t>
+            </a:r>
+            <a:br>
+              <a:rPr lang="en-US" dirty="0"/>
+            </a:br>
+            <a:endParaRPr lang="en-US" dirty="0"/>
+          </a:p>
+          <a:p>
+            <a:r>
+              <a:rPr lang="en-US" dirty="0"/>
+              <a:t>Can we do better at the top, even if we don’t have access to the test list?</a:t>
             </a:r>
           </a:p>
         </p:txBody>
@@ -29284,7 +29304,7 @@
     </p:spTree>
     <p:extLst>
       <p:ext uri="{BB962C8B-B14F-4D97-AF65-F5344CB8AC3E}">
-        <p14:creationId xmlns:p14="http://schemas.microsoft.com/office/powerpoint/2010/main" val="1535530279"/>
+        <p14:creationId xmlns:p14="http://schemas.microsoft.com/office/powerpoint/2010/main" val="4118118316"/>
       </p:ext>
     </p:extLst>
   </p:cSld>
@@ -29334,17 +29354,17 @@
           <a:p>
             <a:r>
               <a:rPr lang="en-US" dirty="0"/>
-              <a:t>Reminders</a:t>
+              <a:t>Discussion Question</a:t>
             </a:r>
           </a:p>
         </p:txBody>
       </p:sp>
       <p:sp>
         <p:nvSpPr>
-          <p:cNvPr id="5" name="Text Placeholder 4">
+          <p:cNvPr id="4" name="Text Placeholder 3">
             <a:extLst>
               <a:ext uri="{FF2B5EF4-FFF2-40B4-BE49-F238E27FC236}">
-                <a16:creationId xmlns:a16="http://schemas.microsoft.com/office/drawing/2014/main" id="{F4E0A5F0-1D89-954D-91FB-596CD9E690F2}"/>
+                <a16:creationId xmlns:a16="http://schemas.microsoft.com/office/drawing/2014/main" id="{5E600BA7-FA45-884F-9820-9E5F2CB7AA48}"/>
               </a:ext>
             </a:extLst>
           </p:cNvPr>
@@ -29360,88 +29380,12 @@
           <a:bodyPr/>
           <a:lstStyle/>
           <a:p>
-            <a:pPr marL="76200" indent="0">
+            <a:pPr marL="76200" indent="0" algn="ctr">
               <a:buNone/>
             </a:pPr>
             <a:r>
-              <a:rPr lang="en-US" b="1" dirty="0"/>
-              <a:t>This week:</a:t>
-            </a:r>
-            <a:endParaRPr lang="en-US" dirty="0"/>
-          </a:p>
-          <a:p>
-            <a:r>
-              <a:rPr lang="en-US" dirty="0"/>
-              <a:t>Project check-in on Wednesday</a:t>
-            </a:r>
-          </a:p>
-          <a:p>
-            <a:r>
-              <a:rPr lang="en-US" dirty="0"/>
-              <a:t>Group work on Thursday</a:t>
-            </a:r>
-          </a:p>
-          <a:p>
-            <a:pPr marL="76200" indent="0">
-              <a:buNone/>
-            </a:pPr>
-            <a:endParaRPr lang="en-US" dirty="0"/>
-          </a:p>
-          <a:p>
-            <a:pPr marL="76200" indent="0">
-              <a:buNone/>
-            </a:pPr>
-            <a:r>
-              <a:rPr lang="en-US" b="1" dirty="0"/>
-              <a:t>Coming up next week:</a:t>
-            </a:r>
-          </a:p>
-          <a:p>
-            <a:r>
-              <a:rPr lang="en-US" dirty="0"/>
-              <a:t>Due </a:t>
-            </a:r>
-            <a:r>
-              <a:rPr lang="en-US" b="1" dirty="0"/>
-              <a:t>Monday</a:t>
-            </a:r>
-            <a:r>
-              <a:rPr lang="en-US" dirty="0"/>
-              <a:t>: </a:t>
-            </a:r>
-            <a:r>
-              <a:rPr lang="en-US" dirty="0">
-                <a:hlinkClick r:id="rId2"/>
-              </a:rPr>
-              <a:t>update assignment</a:t>
-            </a:r>
-            <a:endParaRPr lang="en-US" dirty="0"/>
-          </a:p>
-          <a:p>
-            <a:r>
-              <a:rPr lang="en-US" dirty="0"/>
-              <a:t>Reading for Tuesday</a:t>
-            </a:r>
-          </a:p>
-          <a:p>
-            <a:pPr marL="76200" indent="0">
-              <a:buNone/>
-            </a:pPr>
-            <a:endParaRPr lang="en-US" dirty="0"/>
-          </a:p>
-          <a:p>
-            <a:pPr marL="76200" indent="0">
-              <a:buNone/>
-            </a:pPr>
-            <a:r>
-              <a:rPr lang="en-US" b="1" dirty="0"/>
-              <a:t>Coming up the following week:</a:t>
-            </a:r>
-          </a:p>
-          <a:p>
-            <a:r>
-              <a:rPr lang="en-US" dirty="0"/>
-              <a:t>Midterm Project Progress Presentations</a:t>
+              <a:rPr lang="en-US" sz="3600" dirty="0"/>
+              <a:t>What would be some potential strategies for integrating considerations around fairness in the process of model evaluation and selection?</a:t>
             </a:r>
           </a:p>
         </p:txBody>
@@ -29449,7 +29393,7 @@
     </p:spTree>
     <p:extLst>
       <p:ext uri="{BB962C8B-B14F-4D97-AF65-F5344CB8AC3E}">
-        <p14:creationId xmlns:p14="http://schemas.microsoft.com/office/powerpoint/2010/main" val="3654034958"/>
+        <p14:creationId xmlns:p14="http://schemas.microsoft.com/office/powerpoint/2010/main" val="1535530279"/>
       </p:ext>
     </p:extLst>
   </p:cSld>
@@ -29588,7 +29532,741 @@
 </p:sld>
 </file>
 
+<file path=ppt/slides/slide50.xml><?xml version="1.0" encoding="utf-8"?>
+<p:sld xmlns:a="http://schemas.openxmlformats.org/drawingml/2006/main" xmlns:r="http://schemas.openxmlformats.org/officeDocument/2006/relationships" xmlns:p="http://schemas.openxmlformats.org/presentationml/2006/main">
+  <p:cSld>
+    <p:spTree>
+      <p:nvGrpSpPr>
+        <p:cNvPr id="1" name=""/>
+        <p:cNvGrpSpPr/>
+        <p:nvPr/>
+      </p:nvGrpSpPr>
+      <p:grpSpPr>
+        <a:xfrm>
+          <a:off x="0" y="0"/>
+          <a:ext cx="0" cy="0"/>
+          <a:chOff x="0" y="0"/>
+          <a:chExt cx="0" cy="0"/>
+        </a:xfrm>
+      </p:grpSpPr>
+      <p:sp>
+        <p:nvSpPr>
+          <p:cNvPr id="3" name="Title 2">
+            <a:extLst>
+              <a:ext uri="{FF2B5EF4-FFF2-40B4-BE49-F238E27FC236}">
+                <a16:creationId xmlns:a16="http://schemas.microsoft.com/office/drawing/2014/main" id="{9323871C-7CA8-1448-8FFC-1AE6E1838941}"/>
+              </a:ext>
+            </a:extLst>
+          </p:cNvPr>
+          <p:cNvSpPr>
+            <a:spLocks noGrp="1"/>
+          </p:cNvSpPr>
+          <p:nvPr>
+            <p:ph type="title"/>
+          </p:nvPr>
+        </p:nvSpPr>
+        <p:spPr/>
+        <p:txBody>
+          <a:bodyPr/>
+          <a:lstStyle/>
+          <a:p>
+            <a:r>
+              <a:rPr lang="en-US" dirty="0"/>
+              <a:t>Reminders</a:t>
+            </a:r>
+          </a:p>
+        </p:txBody>
+      </p:sp>
+      <p:sp>
+        <p:nvSpPr>
+          <p:cNvPr id="5" name="Text Placeholder 4">
+            <a:extLst>
+              <a:ext uri="{FF2B5EF4-FFF2-40B4-BE49-F238E27FC236}">
+                <a16:creationId xmlns:a16="http://schemas.microsoft.com/office/drawing/2014/main" id="{F4E0A5F0-1D89-954D-91FB-596CD9E690F2}"/>
+              </a:ext>
+            </a:extLst>
+          </p:cNvPr>
+          <p:cNvSpPr>
+            <a:spLocks noGrp="1"/>
+          </p:cNvSpPr>
+          <p:nvPr>
+            <p:ph type="body" idx="1"/>
+          </p:nvPr>
+        </p:nvSpPr>
+        <p:spPr/>
+        <p:txBody>
+          <a:bodyPr/>
+          <a:lstStyle/>
+          <a:p>
+            <a:pPr marL="76200" indent="0">
+              <a:buNone/>
+            </a:pPr>
+            <a:r>
+              <a:rPr lang="en-US" b="1" dirty="0"/>
+              <a:t>This week:</a:t>
+            </a:r>
+            <a:endParaRPr lang="en-US" dirty="0"/>
+          </a:p>
+          <a:p>
+            <a:r>
+              <a:rPr lang="en-US" dirty="0"/>
+              <a:t>Project check-in on Wednesday</a:t>
+            </a:r>
+          </a:p>
+          <a:p>
+            <a:r>
+              <a:rPr lang="en-US" dirty="0"/>
+              <a:t>Group work on Thursday</a:t>
+            </a:r>
+          </a:p>
+          <a:p>
+            <a:pPr marL="76200" indent="0">
+              <a:buNone/>
+            </a:pPr>
+            <a:endParaRPr lang="en-US" dirty="0"/>
+          </a:p>
+          <a:p>
+            <a:pPr marL="76200" indent="0">
+              <a:buNone/>
+            </a:pPr>
+            <a:r>
+              <a:rPr lang="en-US" b="1" dirty="0"/>
+              <a:t>Coming up next week:</a:t>
+            </a:r>
+          </a:p>
+          <a:p>
+            <a:r>
+              <a:rPr lang="en-US" dirty="0"/>
+              <a:t>Due </a:t>
+            </a:r>
+            <a:r>
+              <a:rPr lang="en-US" b="1" dirty="0"/>
+              <a:t>Monday</a:t>
+            </a:r>
+            <a:r>
+              <a:rPr lang="en-US" dirty="0"/>
+              <a:t>: </a:t>
+            </a:r>
+            <a:r>
+              <a:rPr lang="en-US" dirty="0">
+                <a:hlinkClick r:id="rId2"/>
+              </a:rPr>
+              <a:t>update assignment</a:t>
+            </a:r>
+            <a:r>
+              <a:rPr lang="en-US" dirty="0"/>
+              <a:t> (and revisions from last week)</a:t>
+            </a:r>
+          </a:p>
+          <a:p>
+            <a:r>
+              <a:rPr lang="en-US" dirty="0"/>
+              <a:t>Reading for Tuesday</a:t>
+            </a:r>
+          </a:p>
+          <a:p>
+            <a:pPr marL="76200" indent="0">
+              <a:buNone/>
+            </a:pPr>
+            <a:endParaRPr lang="en-US" dirty="0"/>
+          </a:p>
+          <a:p>
+            <a:pPr marL="76200" indent="0">
+              <a:buNone/>
+            </a:pPr>
+            <a:r>
+              <a:rPr lang="en-US" b="1" dirty="0"/>
+              <a:t>Coming up the following week:</a:t>
+            </a:r>
+          </a:p>
+          <a:p>
+            <a:r>
+              <a:rPr lang="en-US" dirty="0"/>
+              <a:t>Midterm Project Progress Presentations</a:t>
+            </a:r>
+          </a:p>
+        </p:txBody>
+      </p:sp>
+    </p:spTree>
+    <p:extLst>
+      <p:ext uri="{BB962C8B-B14F-4D97-AF65-F5344CB8AC3E}">
+        <p14:creationId xmlns:p14="http://schemas.microsoft.com/office/powerpoint/2010/main" val="3654034958"/>
+      </p:ext>
+    </p:extLst>
+  </p:cSld>
+  <p:clrMapOvr>
+    <a:masterClrMapping/>
+  </p:clrMapOvr>
+</p:sld>
+</file>
+
 <file path=ppt/slides/slide6.xml><?xml version="1.0" encoding="utf-8"?>
+<p:sld xmlns:a="http://schemas.openxmlformats.org/drawingml/2006/main" xmlns:r="http://schemas.openxmlformats.org/officeDocument/2006/relationships" xmlns:p="http://schemas.openxmlformats.org/presentationml/2006/main">
+  <p:cSld>
+    <p:spTree>
+      <p:nvGrpSpPr>
+        <p:cNvPr id="1" name=""/>
+        <p:cNvGrpSpPr/>
+        <p:nvPr/>
+      </p:nvGrpSpPr>
+      <p:grpSpPr>
+        <a:xfrm>
+          <a:off x="0" y="0"/>
+          <a:ext cx="0" cy="0"/>
+          <a:chOff x="0" y="0"/>
+          <a:chExt cx="0" cy="0"/>
+        </a:xfrm>
+      </p:grpSpPr>
+      <p:sp>
+        <p:nvSpPr>
+          <p:cNvPr id="3" name="Title 2"/>
+          <p:cNvSpPr>
+            <a:spLocks noGrp="1"/>
+          </p:cNvSpPr>
+          <p:nvPr>
+            <p:ph type="title"/>
+          </p:nvPr>
+        </p:nvSpPr>
+        <p:spPr/>
+        <p:txBody>
+          <a:bodyPr/>
+          <a:lstStyle/>
+          <a:p>
+            <a:r>
+              <a:rPr lang="en-US" dirty="0"/>
+              <a:t>Reminder: The PR-k graph</a:t>
+            </a:r>
+          </a:p>
+        </p:txBody>
+      </p:sp>
+      <p:grpSp>
+        <p:nvGrpSpPr>
+          <p:cNvPr id="5" name="Group 4"/>
+          <p:cNvGrpSpPr/>
+          <p:nvPr/>
+        </p:nvGrpSpPr>
+        <p:grpSpPr>
+          <a:xfrm>
+            <a:off x="2435740" y="1562635"/>
+            <a:ext cx="7320520" cy="4944871"/>
+            <a:chOff x="616981" y="1325057"/>
+            <a:chExt cx="7320520" cy="4944871"/>
+          </a:xfrm>
+        </p:grpSpPr>
+        <p:pic>
+          <p:nvPicPr>
+            <p:cNvPr id="4" name="Picture 3"/>
+            <p:cNvPicPr>
+              <a:picLocks noChangeAspect="1"/>
+            </p:cNvPicPr>
+            <p:nvPr/>
+          </p:nvPicPr>
+          <p:blipFill>
+            <a:blip r:embed="rId2"/>
+            <a:stretch>
+              <a:fillRect/>
+            </a:stretch>
+          </p:blipFill>
+          <p:spPr>
+            <a:xfrm>
+              <a:off x="616981" y="1325057"/>
+              <a:ext cx="7320520" cy="4944871"/>
+            </a:xfrm>
+            <a:prstGeom prst="rect">
+              <a:avLst/>
+            </a:prstGeom>
+          </p:spPr>
+        </p:pic>
+        <p:sp>
+          <p:nvSpPr>
+            <p:cNvPr id="2" name="Rectangle 1"/>
+            <p:cNvSpPr/>
+            <p:nvPr/>
+          </p:nvSpPr>
+          <p:spPr>
+            <a:xfrm>
+              <a:off x="4064000" y="1409700"/>
+              <a:ext cx="342900" cy="279400"/>
+            </a:xfrm>
+            <a:prstGeom prst="rect">
+              <a:avLst/>
+            </a:prstGeom>
+            <a:ln>
+              <a:noFill/>
+            </a:ln>
+          </p:spPr>
+          <p:style>
+            <a:lnRef idx="2">
+              <a:schemeClr val="dk1"/>
+            </a:lnRef>
+            <a:fillRef idx="1">
+              <a:schemeClr val="lt1"/>
+            </a:fillRef>
+            <a:effectRef idx="0">
+              <a:schemeClr val="dk1"/>
+            </a:effectRef>
+            <a:fontRef idx="minor">
+              <a:schemeClr val="dk1"/>
+            </a:fontRef>
+          </p:style>
+          <p:txBody>
+            <a:bodyPr rtlCol="0" anchor="ctr"/>
+            <a:lstStyle/>
+            <a:p>
+              <a:pPr algn="ctr" defTabSz="457200">
+                <a:buClrTx/>
+              </a:pPr>
+              <a:endParaRPr lang="en-US" sz="1800" kern="1200">
+                <a:solidFill>
+                  <a:prstClr val="black"/>
+                </a:solidFill>
+                <a:latin typeface="Calibri"/>
+              </a:endParaRPr>
+            </a:p>
+          </p:txBody>
+        </p:sp>
+      </p:grpSp>
+      <p:grpSp>
+        <p:nvGrpSpPr>
+          <p:cNvPr id="9" name="Group 8">
+            <a:extLst>
+              <a:ext uri="{FF2B5EF4-FFF2-40B4-BE49-F238E27FC236}">
+                <a16:creationId xmlns:a16="http://schemas.microsoft.com/office/drawing/2014/main" id="{100148AF-CA57-0541-9177-560EC8D36156}"/>
+              </a:ext>
+            </a:extLst>
+          </p:cNvPr>
+          <p:cNvGrpSpPr/>
+          <p:nvPr/>
+        </p:nvGrpSpPr>
+        <p:grpSpPr>
+          <a:xfrm>
+            <a:off x="3018798" y="1150982"/>
+            <a:ext cx="6607802" cy="882961"/>
+            <a:chOff x="1494798" y="1150981"/>
+            <a:chExt cx="6607802" cy="882961"/>
+          </a:xfrm>
+        </p:grpSpPr>
+        <p:sp>
+          <p:nvSpPr>
+            <p:cNvPr id="6" name="TextBox 5"/>
+            <p:cNvSpPr txBox="1"/>
+            <p:nvPr/>
+          </p:nvSpPr>
+          <p:spPr>
+            <a:xfrm>
+              <a:off x="1494798" y="1387611"/>
+              <a:ext cx="6607802" cy="646331"/>
+            </a:xfrm>
+            <a:prstGeom prst="rect">
+              <a:avLst/>
+            </a:prstGeom>
+            <a:noFill/>
+          </p:spPr>
+          <p:txBody>
+            <a:bodyPr wrap="square" rtlCol="0">
+              <a:spAutoFit/>
+            </a:bodyPr>
+            <a:lstStyle/>
+            <a:p>
+              <a:pPr defTabSz="457200">
+                <a:buClrTx/>
+              </a:pPr>
+              <a:r>
+                <a:rPr lang="en-US" sz="1800" b="1" kern="1200" dirty="0">
+                  <a:solidFill>
+                    <a:srgbClr val="C0504D">
+                      <a:lumMod val="75000"/>
+                    </a:srgbClr>
+                  </a:solidFill>
+                  <a:latin typeface="Calibri"/>
+                  <a:ea typeface="+mn-ea"/>
+                  <a:cs typeface="+mn-cs"/>
+                </a:rPr>
+                <a:t>1         .9     .8                .7        .6            .5    .4  .3.                  .2     .1 </a:t>
+              </a:r>
+            </a:p>
+            <a:p>
+              <a:pPr defTabSz="457200">
+                <a:buClrTx/>
+              </a:pPr>
+              <a:r>
+                <a:rPr lang="en-US" sz="1050" b="1" kern="1200" dirty="0">
+                  <a:solidFill>
+                    <a:srgbClr val="C0504D">
+                      <a:lumMod val="75000"/>
+                    </a:srgbClr>
+                  </a:solidFill>
+                  <a:latin typeface="Calibri"/>
+                  <a:ea typeface="+mn-ea"/>
+                  <a:cs typeface="+mn-cs"/>
+                </a:rPr>
+                <a:t> |                  |             |                               |                  |                        |           |        |                                    |            |</a:t>
+              </a:r>
+              <a:r>
+                <a:rPr lang="en-US" sz="1800" b="1" kern="1200" dirty="0">
+                  <a:solidFill>
+                    <a:srgbClr val="C0504D">
+                      <a:lumMod val="75000"/>
+                    </a:srgbClr>
+                  </a:solidFill>
+                  <a:latin typeface="Calibri"/>
+                  <a:ea typeface="+mn-ea"/>
+                  <a:cs typeface="+mn-cs"/>
+                </a:rPr>
+                <a:t>   </a:t>
+              </a:r>
+              <a:r>
+                <a:rPr lang="en-US" sz="1800" kern="1200" dirty="0">
+                  <a:solidFill>
+                    <a:srgbClr val="EEECE1">
+                      <a:lumMod val="25000"/>
+                    </a:srgbClr>
+                  </a:solidFill>
+                  <a:latin typeface="Calibri"/>
+                  <a:ea typeface="+mn-ea"/>
+                  <a:cs typeface="+mn-cs"/>
+                </a:rPr>
+                <a:t>      </a:t>
+              </a:r>
+            </a:p>
+          </p:txBody>
+        </p:sp>
+        <p:sp>
+          <p:nvSpPr>
+            <p:cNvPr id="8" name="TextBox 7">
+              <a:extLst>
+                <a:ext uri="{FF2B5EF4-FFF2-40B4-BE49-F238E27FC236}">
+                  <a16:creationId xmlns:a16="http://schemas.microsoft.com/office/drawing/2014/main" id="{EFA4ED1E-FBFF-4545-BB64-FFD28CAC8A4B}"/>
+                </a:ext>
+              </a:extLst>
+            </p:cNvPr>
+            <p:cNvSpPr txBox="1"/>
+            <p:nvPr/>
+          </p:nvSpPr>
+          <p:spPr>
+            <a:xfrm>
+              <a:off x="4097994" y="1150981"/>
+              <a:ext cx="700705" cy="369332"/>
+            </a:xfrm>
+            <a:prstGeom prst="rect">
+              <a:avLst/>
+            </a:prstGeom>
+            <a:noFill/>
+          </p:spPr>
+          <p:txBody>
+            <a:bodyPr wrap="none" rtlCol="0">
+              <a:spAutoFit/>
+            </a:bodyPr>
+            <a:lstStyle/>
+            <a:p>
+              <a:pPr defTabSz="457200">
+                <a:buClrTx/>
+              </a:pPr>
+              <a:r>
+                <a:rPr lang="en-US" sz="1800" b="1" kern="1200" dirty="0">
+                  <a:solidFill>
+                    <a:srgbClr val="C00000"/>
+                  </a:solidFill>
+                  <a:latin typeface="Calibri"/>
+                  <a:ea typeface="+mn-ea"/>
+                  <a:cs typeface="+mn-cs"/>
+                </a:rPr>
+                <a:t>Score</a:t>
+              </a:r>
+            </a:p>
+          </p:txBody>
+        </p:sp>
+      </p:grpSp>
+      <p:grpSp>
+        <p:nvGrpSpPr>
+          <p:cNvPr id="15" name="Group 14">
+            <a:extLst>
+              <a:ext uri="{FF2B5EF4-FFF2-40B4-BE49-F238E27FC236}">
+                <a16:creationId xmlns:a16="http://schemas.microsoft.com/office/drawing/2014/main" id="{F79BF13E-AE77-6A46-B2C2-E1985346BF6A}"/>
+              </a:ext>
+            </a:extLst>
+          </p:cNvPr>
+          <p:cNvGrpSpPr/>
+          <p:nvPr/>
+        </p:nvGrpSpPr>
+        <p:grpSpPr>
+          <a:xfrm>
+            <a:off x="1836283" y="5550212"/>
+            <a:ext cx="7221578" cy="369332"/>
+            <a:chOff x="312283" y="5550212"/>
+            <a:chExt cx="7221578" cy="369332"/>
+          </a:xfrm>
+        </p:grpSpPr>
+        <p:cxnSp>
+          <p:nvCxnSpPr>
+            <p:cNvPr id="11" name="Straight Connector 10">
+              <a:extLst>
+                <a:ext uri="{FF2B5EF4-FFF2-40B4-BE49-F238E27FC236}">
+                  <a16:creationId xmlns:a16="http://schemas.microsoft.com/office/drawing/2014/main" id="{91561906-EEC1-6046-905E-0E55B1D4B60D}"/>
+                </a:ext>
+              </a:extLst>
+            </p:cNvPr>
+            <p:cNvCxnSpPr/>
+            <p:nvPr/>
+          </p:nvCxnSpPr>
+          <p:spPr>
+            <a:xfrm flipH="1">
+              <a:off x="1649896" y="5734878"/>
+              <a:ext cx="5883965" cy="0"/>
+            </a:xfrm>
+            <a:prstGeom prst="line">
+              <a:avLst/>
+            </a:prstGeom>
+            <a:ln w="28575">
+              <a:solidFill>
+                <a:srgbClr val="00B0F0"/>
+              </a:solidFill>
+            </a:ln>
+          </p:spPr>
+          <p:style>
+            <a:lnRef idx="2">
+              <a:schemeClr val="accent1"/>
+            </a:lnRef>
+            <a:fillRef idx="0">
+              <a:schemeClr val="accent1"/>
+            </a:fillRef>
+            <a:effectRef idx="1">
+              <a:schemeClr val="accent1"/>
+            </a:effectRef>
+            <a:fontRef idx="minor">
+              <a:schemeClr val="tx1"/>
+            </a:fontRef>
+          </p:style>
+        </p:cxnSp>
+        <p:sp>
+          <p:nvSpPr>
+            <p:cNvPr id="12" name="TextBox 11">
+              <a:extLst>
+                <a:ext uri="{FF2B5EF4-FFF2-40B4-BE49-F238E27FC236}">
+                  <a16:creationId xmlns:a16="http://schemas.microsoft.com/office/drawing/2014/main" id="{79F59512-F15A-1445-8C8B-BFD99D51B252}"/>
+                </a:ext>
+              </a:extLst>
+            </p:cNvPr>
+            <p:cNvSpPr txBox="1"/>
+            <p:nvPr/>
+          </p:nvSpPr>
+          <p:spPr>
+            <a:xfrm>
+              <a:off x="312283" y="5550212"/>
+              <a:ext cx="986167" cy="369332"/>
+            </a:xfrm>
+            <a:prstGeom prst="rect">
+              <a:avLst/>
+            </a:prstGeom>
+            <a:noFill/>
+          </p:spPr>
+          <p:txBody>
+            <a:bodyPr wrap="none" rtlCol="0">
+              <a:spAutoFit/>
+            </a:bodyPr>
+            <a:lstStyle/>
+            <a:p>
+              <a:pPr defTabSz="457200">
+                <a:buClrTx/>
+              </a:pPr>
+              <a:r>
+                <a:rPr lang="en-US" sz="1800" b="1" kern="1200" dirty="0">
+                  <a:solidFill>
+                    <a:srgbClr val="C00000"/>
+                  </a:solidFill>
+                  <a:latin typeface="Calibri"/>
+                  <a:ea typeface="+mn-ea"/>
+                  <a:cs typeface="+mn-cs"/>
+                </a:rPr>
+                <a:t>Baseline</a:t>
+              </a:r>
+            </a:p>
+          </p:txBody>
+        </p:sp>
+        <p:cxnSp>
+          <p:nvCxnSpPr>
+            <p:cNvPr id="14" name="Straight Arrow Connector 13">
+              <a:extLst>
+                <a:ext uri="{FF2B5EF4-FFF2-40B4-BE49-F238E27FC236}">
+                  <a16:creationId xmlns:a16="http://schemas.microsoft.com/office/drawing/2014/main" id="{E9A4A58B-B356-1E41-A6F4-EEF6E44A9AD1}"/>
+                </a:ext>
+              </a:extLst>
+            </p:cNvPr>
+            <p:cNvCxnSpPr>
+              <a:stCxn id="12" idx="3"/>
+            </p:cNvCxnSpPr>
+            <p:nvPr/>
+          </p:nvCxnSpPr>
+          <p:spPr>
+            <a:xfrm>
+              <a:off x="1298450" y="5734878"/>
+              <a:ext cx="281872" cy="0"/>
+            </a:xfrm>
+            <a:prstGeom prst="straightConnector1">
+              <a:avLst/>
+            </a:prstGeom>
+            <a:ln>
+              <a:tailEnd type="triangle"/>
+            </a:ln>
+          </p:spPr>
+          <p:style>
+            <a:lnRef idx="2">
+              <a:schemeClr val="accent1"/>
+            </a:lnRef>
+            <a:fillRef idx="0">
+              <a:schemeClr val="accent1"/>
+            </a:fillRef>
+            <a:effectRef idx="1">
+              <a:schemeClr val="accent1"/>
+            </a:effectRef>
+            <a:fontRef idx="minor">
+              <a:schemeClr val="tx1"/>
+            </a:fontRef>
+          </p:style>
+        </p:cxnSp>
+      </p:grpSp>
+    </p:spTree>
+    <p:extLst>
+      <p:ext uri="{BB962C8B-B14F-4D97-AF65-F5344CB8AC3E}">
+        <p14:creationId xmlns:p14="http://schemas.microsoft.com/office/powerpoint/2010/main" val="3566697360"/>
+      </p:ext>
+    </p:extLst>
+  </p:cSld>
+  <p:clrMapOvr>
+    <a:masterClrMapping/>
+  </p:clrMapOvr>
+  <p:timing>
+    <p:tnLst>
+      <p:par>
+        <p:cTn id="1" dur="indefinite" restart="never" nodeType="tmRoot">
+          <p:childTnLst>
+            <p:seq concurrent="1" nextAc="seek">
+              <p:cTn id="2" dur="indefinite" nodeType="mainSeq">
+                <p:childTnLst>
+                  <p:par>
+                    <p:cTn id="3" fill="hold">
+                      <p:stCondLst>
+                        <p:cond delay="indefinite"/>
+                      </p:stCondLst>
+                      <p:childTnLst>
+                        <p:par>
+                          <p:cTn id="4" fill="hold">
+                            <p:stCondLst>
+                              <p:cond delay="0"/>
+                            </p:stCondLst>
+                            <p:childTnLst>
+                              <p:par>
+                                <p:cTn id="5" presetID="22" presetClass="entr" presetSubtype="4" fill="hold" nodeType="clickEffect">
+                                  <p:stCondLst>
+                                    <p:cond delay="0"/>
+                                  </p:stCondLst>
+                                  <p:childTnLst>
+                                    <p:set>
+                                      <p:cBhvr>
+                                        <p:cTn id="6" dur="1" fill="hold">
+                                          <p:stCondLst>
+                                            <p:cond delay="0"/>
+                                          </p:stCondLst>
+                                        </p:cTn>
+                                        <p:tgtEl>
+                                          <p:spTgt spid="9"/>
+                                        </p:tgtEl>
+                                        <p:attrNameLst>
+                                          <p:attrName>style.visibility</p:attrName>
+                                        </p:attrNameLst>
+                                      </p:cBhvr>
+                                      <p:to>
+                                        <p:strVal val="visible"/>
+                                      </p:to>
+                                    </p:set>
+                                    <p:animEffect transition="in" filter="wipe(down)">
+                                      <p:cBhvr>
+                                        <p:cTn id="7" dur="500"/>
+                                        <p:tgtEl>
+                                          <p:spTgt spid="9"/>
+                                        </p:tgtEl>
+                                      </p:cBhvr>
+                                    </p:animEffect>
+                                  </p:childTnLst>
+                                </p:cTn>
+                              </p:par>
+                            </p:childTnLst>
+                          </p:cTn>
+                        </p:par>
+                      </p:childTnLst>
+                    </p:cTn>
+                  </p:par>
+                  <p:par>
+                    <p:cTn id="8" fill="hold">
+                      <p:stCondLst>
+                        <p:cond delay="indefinite"/>
+                      </p:stCondLst>
+                      <p:childTnLst>
+                        <p:par>
+                          <p:cTn id="9" fill="hold">
+                            <p:stCondLst>
+                              <p:cond delay="0"/>
+                            </p:stCondLst>
+                            <p:childTnLst>
+                              <p:par>
+                                <p:cTn id="10" presetID="1" presetClass="entr" presetSubtype="0" fill="hold" nodeType="clickEffect">
+                                  <p:stCondLst>
+                                    <p:cond delay="0"/>
+                                  </p:stCondLst>
+                                  <p:childTnLst>
+                                    <p:set>
+                                      <p:cBhvr>
+                                        <p:cTn id="11" dur="1" fill="hold">
+                                          <p:stCondLst>
+                                            <p:cond delay="0"/>
+                                          </p:stCondLst>
+                                        </p:cTn>
+                                        <p:tgtEl>
+                                          <p:spTgt spid="15"/>
+                                        </p:tgtEl>
+                                        <p:attrNameLst>
+                                          <p:attrName>style.visibility</p:attrName>
+                                        </p:attrNameLst>
+                                      </p:cBhvr>
+                                      <p:to>
+                                        <p:strVal val="visible"/>
+                                      </p:to>
+                                    </p:set>
+                                  </p:childTnLst>
+                                </p:cTn>
+                              </p:par>
+                            </p:childTnLst>
+                          </p:cTn>
+                        </p:par>
+                      </p:childTnLst>
+                    </p:cTn>
+                  </p:par>
+                </p:childTnLst>
+              </p:cTn>
+              <p:prevCondLst>
+                <p:cond evt="onPrev" delay="0">
+                  <p:tgtEl>
+                    <p:sldTgt/>
+                  </p:tgtEl>
+                </p:cond>
+              </p:prevCondLst>
+              <p:nextCondLst>
+                <p:cond evt="onNext" delay="0">
+                  <p:tgtEl>
+                    <p:sldTgt/>
+                  </p:tgtEl>
+                </p:cond>
+              </p:nextCondLst>
+            </p:seq>
+          </p:childTnLst>
+        </p:cTn>
+      </p:par>
+    </p:tnLst>
+  </p:timing>
+</p:sld>
+</file>
+
+<file path=ppt/slides/slide7.xml><?xml version="1.0" encoding="utf-8"?>
 <p:sld xmlns:a="http://schemas.openxmlformats.org/drawingml/2006/main" xmlns:r="http://schemas.openxmlformats.org/officeDocument/2006/relationships" xmlns:p="http://schemas.openxmlformats.org/presentationml/2006/main">
   <p:cSld>
     <p:spTree>
@@ -29646,7 +30324,7 @@
 </p:sld>
 </file>
 
-<file path=ppt/slides/slide7.xml><?xml version="1.0" encoding="utf-8"?>
+<file path=ppt/slides/slide8.xml><?xml version="1.0" encoding="utf-8"?>
 <p:sld xmlns:a="http://schemas.openxmlformats.org/drawingml/2006/main" xmlns:r="http://schemas.openxmlformats.org/officeDocument/2006/relationships" xmlns:p="http://schemas.openxmlformats.org/presentationml/2006/main">
   <p:cSld>
     <p:spTree>
@@ -29756,7 +30434,7 @@
 </p:sld>
 </file>
 
-<file path=ppt/slides/slide8.xml><?xml version="1.0" encoding="utf-8"?>
+<file path=ppt/slides/slide9.xml><?xml version="1.0" encoding="utf-8"?>
 <p:sld xmlns:a="http://schemas.openxmlformats.org/drawingml/2006/main" xmlns:r="http://schemas.openxmlformats.org/officeDocument/2006/relationships" xmlns:p="http://schemas.openxmlformats.org/presentationml/2006/main">
   <p:cSld>
     <p:spTree>
@@ -29888,14 +30566,14 @@
           </a:ln>
           <a:extLst>
             <a:ext uri="{909E8E84-426E-40dd-AFC4-6F175D3DCCD1}">
-              <a14:hiddenFill xmlns:a14="http://schemas.microsoft.com/office/drawing/2010/main" xmlns="">
+              <a14:hiddenFill xmlns="" xmlns:a14="http://schemas.microsoft.com/office/drawing/2010/main">
                 <a:solidFill>
                   <a:srgbClr val="FFFFFF"/>
                 </a:solidFill>
               </a14:hiddenFill>
             </a:ext>
             <a:ext uri="{91240B29-F687-4f45-9708-019B960494DF}">
-              <a14:hiddenLine xmlns:a14="http://schemas.microsoft.com/office/drawing/2010/main" xmlns="" w="9525">
+              <a14:hiddenLine xmlns="" xmlns:a14="http://schemas.microsoft.com/office/drawing/2010/main" w="9525">
                 <a:solidFill>
                   <a:srgbClr val="000000"/>
                 </a:solidFill>
@@ -30122,14 +30800,14 @@
             </a:ln>
             <a:extLst>
               <a:ext uri="{909E8E84-426E-40dd-AFC4-6F175D3DCCD1}">
-                <a14:hiddenFill xmlns:a14="http://schemas.microsoft.com/office/drawing/2010/main" xmlns="">
+                <a14:hiddenFill xmlns="" xmlns:a14="http://schemas.microsoft.com/office/drawing/2010/main">
                   <a:solidFill>
                     <a:srgbClr val="FFFFFF"/>
                   </a:solidFill>
                 </a14:hiddenFill>
               </a:ext>
               <a:ext uri="{91240B29-F687-4f45-9708-019B960494DF}">
-                <a14:hiddenLine xmlns:a14="http://schemas.microsoft.com/office/drawing/2010/main" xmlns="" w="9525">
+                <a14:hiddenLine xmlns="" xmlns:a14="http://schemas.microsoft.com/office/drawing/2010/main" w="9525">
                   <a:solidFill>
                     <a:srgbClr val="000000"/>
                   </a:solidFill>
@@ -30618,14 +31296,14 @@
           </a:ln>
           <a:extLst>
             <a:ext uri="{909E8E84-426E-40dd-AFC4-6F175D3DCCD1}">
-              <a14:hiddenFill xmlns:a14="http://schemas.microsoft.com/office/drawing/2010/main" xmlns="">
+              <a14:hiddenFill xmlns="" xmlns:a14="http://schemas.microsoft.com/office/drawing/2010/main">
                 <a:solidFill>
                   <a:srgbClr val="FFFFFF"/>
                 </a:solidFill>
               </a14:hiddenFill>
             </a:ext>
             <a:ext uri="{91240B29-F687-4f45-9708-019B960494DF}">
-              <a14:hiddenLine xmlns:a14="http://schemas.microsoft.com/office/drawing/2010/main" xmlns="" w="9525">
+              <a14:hiddenLine xmlns="" xmlns:a14="http://schemas.microsoft.com/office/drawing/2010/main" w="9525">
                 <a:solidFill>
                   <a:srgbClr val="000000"/>
                 </a:solidFill>
@@ -30789,14 +31467,14 @@
             </a:ln>
             <a:extLst>
               <a:ext uri="{909E8E84-426E-40dd-AFC4-6F175D3DCCD1}">
-                <a14:hiddenFill xmlns:a14="http://schemas.microsoft.com/office/drawing/2010/main" xmlns="">
+                <a14:hiddenFill xmlns="" xmlns:a14="http://schemas.microsoft.com/office/drawing/2010/main">
                   <a:solidFill>
                     <a:srgbClr val="FFFFFF"/>
                   </a:solidFill>
                 </a14:hiddenFill>
               </a:ext>
               <a:ext uri="{91240B29-F687-4f45-9708-019B960494DF}">
-                <a14:hiddenLine xmlns:a14="http://schemas.microsoft.com/office/drawing/2010/main" xmlns="" w="9525">
+                <a14:hiddenLine xmlns="" xmlns:a14="http://schemas.microsoft.com/office/drawing/2010/main" w="9525">
                   <a:solidFill>
                     <a:srgbClr val="000000"/>
                   </a:solidFill>
@@ -31381,106 +32059,6 @@
     <p:extLst>
       <p:ext uri="{BB962C8B-B14F-4D97-AF65-F5344CB8AC3E}">
         <p14:creationId xmlns:p14="http://schemas.microsoft.com/office/powerpoint/2010/main" val="3761135247"/>
-      </p:ext>
-    </p:extLst>
-  </p:cSld>
-  <p:clrMapOvr>
-    <a:masterClrMapping/>
-  </p:clrMapOvr>
-</p:sld>
-</file>
-
-<file path=ppt/slides/slide9.xml><?xml version="1.0" encoding="utf-8"?>
-<p:sld xmlns:a="http://schemas.openxmlformats.org/drawingml/2006/main" xmlns:r="http://schemas.openxmlformats.org/officeDocument/2006/relationships" xmlns:p="http://schemas.openxmlformats.org/presentationml/2006/main">
-  <p:cSld>
-    <p:spTree>
-      <p:nvGrpSpPr>
-        <p:cNvPr id="1" name=""/>
-        <p:cNvGrpSpPr/>
-        <p:nvPr/>
-      </p:nvGrpSpPr>
-      <p:grpSpPr>
-        <a:xfrm>
-          <a:off x="0" y="0"/>
-          <a:ext cx="0" cy="0"/>
-          <a:chOff x="0" y="0"/>
-          <a:chExt cx="0" cy="0"/>
-        </a:xfrm>
-      </p:grpSpPr>
-      <p:sp>
-        <p:nvSpPr>
-          <p:cNvPr id="3" name="Title 2"/>
-          <p:cNvSpPr>
-            <a:spLocks noGrp="1"/>
-          </p:cNvSpPr>
-          <p:nvPr>
-            <p:ph type="title"/>
-          </p:nvPr>
-        </p:nvSpPr>
-        <p:spPr/>
-        <p:txBody>
-          <a:bodyPr/>
-          <a:lstStyle/>
-          <a:p>
-            <a:r>
-              <a:rPr lang="en-US" dirty="0"/>
-              <a:t>Why do we need to do model selection?</a:t>
-            </a:r>
-          </a:p>
-        </p:txBody>
-      </p:sp>
-      <p:sp>
-        <p:nvSpPr>
-          <p:cNvPr id="2" name="Content Placeholder 1"/>
-          <p:cNvSpPr>
-            <a:spLocks noGrp="1"/>
-          </p:cNvSpPr>
-          <p:nvPr>
-            <p:ph type="body" idx="1"/>
-          </p:nvPr>
-        </p:nvSpPr>
-        <p:spPr/>
-        <p:txBody>
-          <a:bodyPr/>
-          <a:lstStyle/>
-          <a:p>
-            <a:r>
-              <a:rPr lang="en-US" sz="2800" dirty="0"/>
-              <a:t>You’ve run a large number of different types of models varying …</a:t>
-            </a:r>
-          </a:p>
-          <a:p>
-            <a:endParaRPr lang="en-US" sz="2800" dirty="0"/>
-          </a:p>
-          <a:p>
-            <a:r>
-              <a:rPr lang="en-US" sz="2800" dirty="0"/>
-              <a:t>You need to understand what types of models are effective under what circumstances, </a:t>
-            </a:r>
-            <a:r>
-              <a:rPr lang="en-US" sz="2800" b="1" dirty="0"/>
-              <a:t>and</a:t>
-            </a:r>
-          </a:p>
-          <a:p>
-            <a:endParaRPr lang="en-US" sz="2800" b="1" dirty="0"/>
-          </a:p>
-          <a:p>
-            <a:r>
-              <a:rPr lang="en-US" sz="2800" dirty="0"/>
-              <a:t>You need to decide which one(s) to use in the </a:t>
-            </a:r>
-            <a:r>
-              <a:rPr lang="en-US" sz="2800" b="1" dirty="0"/>
-              <a:t>future</a:t>
-            </a:r>
-          </a:p>
-        </p:txBody>
-      </p:sp>
-    </p:spTree>
-    <p:extLst>
-      <p:ext uri="{BB962C8B-B14F-4D97-AF65-F5344CB8AC3E}">
-        <p14:creationId xmlns:p14="http://schemas.microsoft.com/office/powerpoint/2010/main" val="473448969"/>
       </p:ext>
     </p:extLst>
   </p:cSld>

</xml_diff>